<commit_message>
Avancée Train et POC
Premiers POC + avancée de la compréhension
</commit_message>
<xml_diff>
--- a/presentationVendredi.pptx
+++ b/presentationVendredi.pptx
@@ -384,7 +384,7 @@
             <a:pPr indent="0" algn="r">
               <a:buNone/>
             </a:pPr>
-            <a:fld id="{D03A3CD0-909F-461D-97F5-C8C0CFA79E82}" type="slidenum">
+            <a:fld id="{77A1E7A2-B252-4104-960C-C8B121A203DF}" type="slidenum">
               <a:rPr b="0" lang="fr-FR" sz="1400" spc="-1" strike="noStrike">
                 <a:solidFill>
                   <a:srgbClr val="000000"/>
@@ -438,7 +438,7 @@
         <p:spPr>
           <a:xfrm>
             <a:off x="919080" y="746280"/>
-            <a:ext cx="4957560" cy="3719520"/>
+            <a:ext cx="4957200" cy="3719160"/>
           </a:xfrm>
           <a:prstGeom prst="rect">
             <a:avLst/>
@@ -461,7 +461,7 @@
         <p:spPr>
           <a:xfrm>
             <a:off x="680040" y="4716720"/>
-            <a:ext cx="5436000" cy="4465080"/>
+            <a:ext cx="5435640" cy="4464720"/>
           </a:xfrm>
           <a:prstGeom prst="rect">
             <a:avLst/>
@@ -501,7 +501,7 @@
         <p:spPr>
           <a:xfrm>
             <a:off x="3851280" y="9431640"/>
-            <a:ext cx="2943000" cy="493200"/>
+            <a:ext cx="2942640" cy="492840"/>
           </a:xfrm>
           <a:prstGeom prst="rect">
             <a:avLst/>
@@ -543,7 +543,7 @@
                 <a:tab algn="l" pos="0"/>
               </a:tabLst>
             </a:pPr>
-            <a:fld id="{67A692EC-22A2-48FA-BCB3-C652421ADB66}" type="slidenum">
+            <a:fld id="{3885D8DF-5155-4E70-A9EA-E7AB06441DDA}" type="slidenum">
               <a:rPr b="0" lang="fr-FR" sz="1300" spc="-1" strike="noStrike">
                 <a:solidFill>
                   <a:schemeClr val="dk1"/>
@@ -597,7 +597,7 @@
         <p:spPr>
           <a:xfrm>
             <a:off x="919080" y="746280"/>
-            <a:ext cx="4957560" cy="3719520"/>
+            <a:ext cx="4957200" cy="3719160"/>
           </a:xfrm>
           <a:prstGeom prst="rect">
             <a:avLst/>
@@ -620,7 +620,7 @@
         <p:spPr>
           <a:xfrm>
             <a:off x="680040" y="4716720"/>
-            <a:ext cx="5436000" cy="4465080"/>
+            <a:ext cx="5435640" cy="4464720"/>
           </a:xfrm>
           <a:prstGeom prst="rect">
             <a:avLst/>
@@ -660,7 +660,7 @@
         <p:spPr>
           <a:xfrm>
             <a:off x="3851280" y="9431640"/>
-            <a:ext cx="2943000" cy="493200"/>
+            <a:ext cx="2942640" cy="492840"/>
           </a:xfrm>
           <a:prstGeom prst="rect">
             <a:avLst/>
@@ -702,7 +702,7 @@
                 <a:tab algn="l" pos="0"/>
               </a:tabLst>
             </a:pPr>
-            <a:fld id="{D403B007-5F73-47EF-B892-87A6178E30FA}" type="slidenum">
+            <a:fld id="{C07E664F-1CC7-40DA-A5D6-CE6677F0FEF2}" type="slidenum">
               <a:rPr b="0" lang="fr-FR" sz="1300" spc="-1" strike="noStrike">
                 <a:solidFill>
                   <a:schemeClr val="dk1"/>
@@ -777,7 +777,7 @@
         <p:txBody>
           <a:bodyPr/>
           <a:p>
-            <a:fld id="{10232388-D7C2-432D-9E06-A750C12D9621}" type="slidenum">
+            <a:fld id="{E34A63B4-9965-4F39-B9C7-86445F41FC04}" type="slidenum">
               <a:t>&lt;#&gt;</a:t>
             </a:fld>
           </a:p>
@@ -986,7 +986,7 @@
         <p:txBody>
           <a:bodyPr/>
           <a:p>
-            <a:fld id="{13206843-9BC4-465A-9F71-DE7D4D6C9EBC}" type="slidenum">
+            <a:fld id="{C6DA3E48-41C7-44A0-8AE7-B58CBD463E71}" type="slidenum">
               <a:t>&lt;#&gt;</a:t>
             </a:fld>
           </a:p>
@@ -1281,7 +1281,7 @@
         <p:txBody>
           <a:bodyPr/>
           <a:p>
-            <a:fld id="{299F552C-93FC-4182-AD26-11678BE18726}" type="slidenum">
+            <a:fld id="{9A033B09-C3D4-4D67-939C-4A70C8D945E2}" type="slidenum">
               <a:t>&lt;#&gt;</a:t>
             </a:fld>
           </a:p>
@@ -1662,7 +1662,7 @@
         <p:txBody>
           <a:bodyPr/>
           <a:p>
-            <a:fld id="{31D1DE2D-8D77-4FD1-84E3-38BE25ABDA12}" type="slidenum">
+            <a:fld id="{964BA8FA-7FEC-4B2F-8D45-F3AF67CE8E82}" type="slidenum">
               <a:t>&lt;#&gt;</a:t>
             </a:fld>
           </a:p>
@@ -1825,7 +1825,7 @@
         <p:txBody>
           <a:bodyPr/>
           <a:p>
-            <a:fld id="{1099911E-381B-4048-A6DD-888BB1DADFAF}" type="slidenum">
+            <a:fld id="{29F9FFAE-2D4E-49F7-9457-43FFD6D1944D}" type="slidenum">
               <a:t>&lt;#&gt;</a:t>
             </a:fld>
           </a:p>
@@ -1991,7 +1991,7 @@
         <p:txBody>
           <a:bodyPr/>
           <a:p>
-            <a:fld id="{8FFA1582-DF97-4A52-8929-16A66BD30B12}" type="slidenum">
+            <a:fld id="{D62ADE39-39D3-4770-825C-ED943822BB8D}" type="slidenum">
               <a:t>&lt;#&gt;</a:t>
             </a:fld>
           </a:p>
@@ -2200,7 +2200,7 @@
         <p:txBody>
           <a:bodyPr/>
           <a:p>
-            <a:fld id="{AE12E1AB-7617-4275-8831-F88CDB5C8917}" type="slidenum">
+            <a:fld id="{8B4F1BCD-50B9-4242-A8CF-3D2FB3127A37}" type="slidenum">
               <a:t>&lt;#&gt;</a:t>
             </a:fld>
           </a:p>
@@ -2323,7 +2323,7 @@
         <p:txBody>
           <a:bodyPr/>
           <a:p>
-            <a:fld id="{6F7DB09A-4502-47E6-B7C5-817622200C5B}" type="slidenum">
+            <a:fld id="{289B408E-49A6-48D5-B32A-55C80A9C8052}" type="slidenum">
               <a:t>&lt;#&gt;</a:t>
             </a:fld>
           </a:p>
@@ -2444,7 +2444,7 @@
         <p:txBody>
           <a:bodyPr/>
           <a:p>
-            <a:fld id="{33414A49-8D37-462E-A5BD-4AC9CD9933C8}" type="slidenum">
+            <a:fld id="{7EA8983C-8D5A-41B3-B7D6-B59A0DA9F02D}" type="slidenum">
               <a:t>&lt;#&gt;</a:t>
             </a:fld>
           </a:p>
@@ -2696,7 +2696,7 @@
         <p:txBody>
           <a:bodyPr/>
           <a:p>
-            <a:fld id="{3A53AE3A-92F1-4274-A195-8E8AD148AE0B}" type="slidenum">
+            <a:fld id="{EA6FBE6B-CD62-40F1-B3CC-09ECF52669E2}" type="slidenum">
               <a:t>&lt;#&gt;</a:t>
             </a:fld>
           </a:p>
@@ -2948,7 +2948,7 @@
         <p:txBody>
           <a:bodyPr/>
           <a:p>
-            <a:fld id="{6D0E9B97-A829-4E84-B324-DA3548CEE599}" type="slidenum">
+            <a:fld id="{913084A6-BABC-40E1-8BE3-F82D8C6881FF}" type="slidenum">
               <a:t>&lt;#&gt;</a:t>
             </a:fld>
           </a:p>
@@ -3200,7 +3200,7 @@
         <p:txBody>
           <a:bodyPr/>
           <a:p>
-            <a:fld id="{BF2793B0-01A8-4EC6-97AB-C683B798C6D9}" type="slidenum">
+            <a:fld id="{035597CE-647B-4684-A53B-92F84E22944B}" type="slidenum">
               <a:t>&lt;#&gt;</a:t>
             </a:fld>
           </a:p>
@@ -3265,7 +3265,7 @@
         <p:spPr>
           <a:xfrm>
             <a:off x="0" y="260280"/>
-            <a:ext cx="931680" cy="357120"/>
+            <a:ext cx="931320" cy="356760"/>
           </a:xfrm>
           <a:prstGeom prst="rect">
             <a:avLst/>
@@ -3319,7 +3319,7 @@
         <p:spPr>
           <a:xfrm>
             <a:off x="934920" y="260280"/>
-            <a:ext cx="8203680" cy="357120"/>
+            <a:ext cx="8203320" cy="356760"/>
           </a:xfrm>
           <a:prstGeom prst="rect">
             <a:avLst/>
@@ -3378,7 +3378,7 @@
         <p:spPr>
           <a:xfrm>
             <a:off x="6336720" y="6170040"/>
-            <a:ext cx="2624400" cy="574920"/>
+            <a:ext cx="2624040" cy="574560"/>
           </a:xfrm>
           <a:prstGeom prst="rect">
             <a:avLst/>
@@ -3397,7 +3397,7 @@
         <p:spPr>
           <a:xfrm>
             <a:off x="4267800" y="6642000"/>
-            <a:ext cx="633240" cy="152280"/>
+            <a:ext cx="632880" cy="152280"/>
           </a:xfrm>
           <a:prstGeom prst="rect">
             <a:avLst/>
@@ -3451,7 +3451,7 @@
         <p:spPr>
           <a:xfrm>
             <a:off x="2160" y="620640"/>
-            <a:ext cx="9138600" cy="5505480"/>
+            <a:ext cx="9138240" cy="5505120"/>
           </a:xfrm>
           <a:prstGeom prst="rect">
             <a:avLst/>
@@ -3505,7 +3505,7 @@
         <p:spPr>
           <a:xfrm>
             <a:off x="0" y="0"/>
-            <a:ext cx="9138600" cy="617400"/>
+            <a:ext cx="9138240" cy="617040"/>
           </a:xfrm>
           <a:prstGeom prst="rect">
             <a:avLst/>
@@ -4287,7 +4287,7 @@
         <p:spPr>
           <a:xfrm>
             <a:off x="8893080" y="0"/>
-            <a:ext cx="245520" cy="257040"/>
+            <a:ext cx="245160" cy="256680"/>
           </a:xfrm>
           <a:prstGeom prst="rect">
             <a:avLst/>
@@ -4359,7 +4359,7 @@
         <p:spPr>
           <a:xfrm>
             <a:off x="8893080" y="0"/>
-            <a:ext cx="245520" cy="257040"/>
+            <a:ext cx="245160" cy="256680"/>
           </a:xfrm>
           <a:prstGeom prst="rect">
             <a:avLst/>
@@ -4403,7 +4403,7 @@
                 <a:tab algn="l" pos="0"/>
               </a:tabLst>
             </a:pPr>
-            <a:fld id="{D9789141-F866-4A0F-9FC6-6A8B8855BBC6}" type="slidenum">
+            <a:fld id="{33DB2286-2408-4266-A22B-C0819161B750}" type="slidenum">
               <a:rPr b="0" lang="fr-FR" sz="100" spc="-1" strike="noStrike">
                 <a:solidFill>
                   <a:schemeClr val="lt1">
@@ -4437,7 +4437,7 @@
         <p:spPr>
           <a:xfrm>
             <a:off x="8893080" y="0"/>
-            <a:ext cx="247680" cy="257040"/>
+            <a:ext cx="247320" cy="256680"/>
           </a:xfrm>
           <a:prstGeom prst="rect">
             <a:avLst/>
@@ -4530,7 +4530,7 @@
         <p:spPr>
           <a:xfrm>
             <a:off x="1260000" y="1980000"/>
-            <a:ext cx="6477480" cy="3494160"/>
+            <a:ext cx="6477120" cy="3493800"/>
           </a:xfrm>
           <a:prstGeom prst="rect">
             <a:avLst/>
@@ -4595,7 +4595,7 @@
         <p:spPr>
           <a:xfrm>
             <a:off x="8820000" y="6480000"/>
-            <a:ext cx="378360" cy="426600"/>
+            <a:ext cx="378000" cy="426240"/>
           </a:xfrm>
           <a:prstGeom prst="rect">
             <a:avLst/>
@@ -4621,7 +4621,7 @@
                 <a:spcPct val="100000"/>
               </a:lnSpc>
             </a:pPr>
-            <a:fld id="{C58B9957-E039-45AD-9795-F7F206BD803A}" type="slidenum">
+            <a:fld id="{DD316B24-EBB6-44AF-A248-C13577594A5C}" type="slidenum">
               <a:rPr b="0" lang="fr-FR" sz="2400" spc="-1" strike="noStrike">
                 <a:solidFill>
                   <a:srgbClr val="000000"/>
@@ -4653,7 +4653,7 @@
         <p:txBody>
           <a:bodyPr/>
           <a:p>
-            <a:fld id="{E5DC9E88-BC8C-4E76-AAC2-FBE2DA8A87EE}" type="slidenum">
+            <a:fld id="{8783FA4D-F783-4EB7-A344-493419CBAC86}" type="slidenum">
               <a:t>1</a:t>
             </a:fld>
           </a:p>
@@ -4702,7 +4702,7 @@
         <p:spPr>
           <a:xfrm>
             <a:off x="1008000" y="260280"/>
-            <a:ext cx="7845480" cy="357120"/>
+            <a:ext cx="7845120" cy="356760"/>
           </a:xfrm>
           <a:prstGeom prst="rect">
             <a:avLst/>
@@ -4758,7 +4758,7 @@
         <p:spPr>
           <a:xfrm>
             <a:off x="107640" y="1260000"/>
-            <a:ext cx="2949480" cy="1104480"/>
+            <a:ext cx="2949120" cy="1104120"/>
           </a:xfrm>
           <a:prstGeom prst="rect">
             <a:avLst/>
@@ -4821,7 +4821,7 @@
         <p:spPr>
           <a:xfrm>
             <a:off x="3373920" y="720000"/>
-            <a:ext cx="4363920" cy="5186880"/>
+            <a:ext cx="4363560" cy="5186520"/>
           </a:xfrm>
           <a:prstGeom prst="rect">
             <a:avLst/>
@@ -4840,7 +4840,7 @@
         <p:spPr>
           <a:xfrm>
             <a:off x="8729640" y="6431040"/>
-            <a:ext cx="484920" cy="426600"/>
+            <a:ext cx="484560" cy="426240"/>
           </a:xfrm>
           <a:prstGeom prst="rect">
             <a:avLst/>
@@ -4866,7 +4866,7 @@
                 <a:spcPct val="100000"/>
               </a:lnSpc>
             </a:pPr>
-            <a:fld id="{9739E4BF-A414-4A94-8934-650F318B747F}" type="slidenum">
+            <a:fld id="{E63498F7-EAE9-48D4-A6CA-0BB13B58A41D}" type="slidenum">
               <a:rPr b="0" lang="fr-FR" sz="2400" spc="-1" strike="noStrike">
                 <a:solidFill>
                   <a:srgbClr val="000000"/>
@@ -4898,7 +4898,7 @@
         <p:txBody>
           <a:bodyPr/>
           <a:p>
-            <a:fld id="{07CC1065-D2B5-419D-ADDC-5E26BAB9FC10}" type="slidenum">
+            <a:fld id="{F0B93880-FA5D-42CC-B5A6-F6E8D52A7C8F}" type="slidenum">
               <a:t>10</a:t>
             </a:fld>
           </a:p>
@@ -4947,7 +4947,7 @@
         <p:spPr>
           <a:xfrm>
             <a:off x="4548240" y="696960"/>
-            <a:ext cx="4089960" cy="2901240"/>
+            <a:ext cx="4089600" cy="2900880"/>
           </a:xfrm>
           <a:prstGeom prst="rect">
             <a:avLst/>
@@ -4966,7 +4966,7 @@
         <p:spPr>
           <a:xfrm>
             <a:off x="360000" y="900000"/>
-            <a:ext cx="3958200" cy="898200"/>
+            <a:ext cx="3957840" cy="897840"/>
           </a:xfrm>
           <a:prstGeom prst="rect">
             <a:avLst/>
@@ -5023,7 +5023,7 @@
         <p:spPr>
           <a:xfrm>
             <a:off x="180000" y="3683880"/>
-            <a:ext cx="8502480" cy="2398320"/>
+            <a:ext cx="8502120" cy="2397960"/>
           </a:xfrm>
           <a:prstGeom prst="rect">
             <a:avLst/>
@@ -5042,7 +5042,7 @@
         <p:spPr>
           <a:xfrm>
             <a:off x="360000" y="3240000"/>
-            <a:ext cx="3958200" cy="358200"/>
+            <a:ext cx="3957840" cy="357840"/>
           </a:xfrm>
           <a:prstGeom prst="rect">
             <a:avLst/>
@@ -5095,7 +5095,7 @@
         <p:spPr>
           <a:xfrm>
             <a:off x="8730000" y="6431400"/>
-            <a:ext cx="484920" cy="426600"/>
+            <a:ext cx="484560" cy="426240"/>
           </a:xfrm>
           <a:prstGeom prst="rect">
             <a:avLst/>
@@ -5121,7 +5121,7 @@
                 <a:spcPct val="100000"/>
               </a:lnSpc>
             </a:pPr>
-            <a:fld id="{738E69FD-5E6E-4905-BA5F-852796B124F0}" type="slidenum">
+            <a:fld id="{5BBEB337-5B7C-4B38-B461-250BA6C21FBC}" type="slidenum">
               <a:rPr b="0" lang="fr-FR" sz="2400" spc="-1" strike="noStrike">
                 <a:solidFill>
                   <a:srgbClr val="000000"/>
@@ -5153,7 +5153,7 @@
         <p:txBody>
           <a:bodyPr/>
           <a:p>
-            <a:fld id="{581CA783-52FB-4E4E-9042-63606C3FE301}" type="slidenum">
+            <a:fld id="{C331B0DB-CBEF-42D4-8EBC-31B338757C70}" type="slidenum">
               <a:t>11</a:t>
             </a:fld>
           </a:p>
@@ -5198,7 +5198,7 @@
         <p:spPr>
           <a:xfrm>
             <a:off x="540000" y="1080000"/>
-            <a:ext cx="3418200" cy="898200"/>
+            <a:ext cx="3417840" cy="897840"/>
           </a:xfrm>
           <a:prstGeom prst="rect">
             <a:avLst/>
@@ -5255,7 +5255,7 @@
         <p:spPr>
           <a:xfrm>
             <a:off x="3816000" y="684000"/>
-            <a:ext cx="3922200" cy="1788480"/>
+            <a:ext cx="3921840" cy="1788120"/>
           </a:xfrm>
           <a:prstGeom prst="rect">
             <a:avLst/>
@@ -5274,7 +5274,7 @@
         <p:spPr>
           <a:xfrm>
             <a:off x="540000" y="2880000"/>
-            <a:ext cx="3598200" cy="1438200"/>
+            <a:ext cx="3597840" cy="1437840"/>
           </a:xfrm>
           <a:prstGeom prst="rect">
             <a:avLst/>
@@ -5343,7 +5343,7 @@
         <p:spPr>
           <a:xfrm>
             <a:off x="669600" y="4680000"/>
-            <a:ext cx="6708600" cy="358200"/>
+            <a:ext cx="6708240" cy="357840"/>
           </a:xfrm>
           <a:prstGeom prst="rect">
             <a:avLst/>
@@ -5362,7 +5362,7 @@
         <p:spPr>
           <a:xfrm>
             <a:off x="8730000" y="6431400"/>
-            <a:ext cx="484920" cy="426600"/>
+            <a:ext cx="484560" cy="426240"/>
           </a:xfrm>
           <a:prstGeom prst="rect">
             <a:avLst/>
@@ -5388,7 +5388,7 @@
                 <a:spcPct val="100000"/>
               </a:lnSpc>
             </a:pPr>
-            <a:fld id="{C71E9D07-A1A7-4E65-9252-6026DE824F18}" type="slidenum">
+            <a:fld id="{D1FE2906-2B53-4B54-B239-3F3A775201C6}" type="slidenum">
               <a:rPr b="0" lang="fr-FR" sz="2400" spc="-1" strike="noStrike">
                 <a:solidFill>
                   <a:srgbClr val="000000"/>
@@ -5420,7 +5420,7 @@
         <p:txBody>
           <a:bodyPr/>
           <a:p>
-            <a:fld id="{10E4E514-27E2-4EBE-93EC-314DE36FA5B1}" type="slidenum">
+            <a:fld id="{865F6DC1-EE9F-40E4-B6F6-DF2D7FA62E9D}" type="slidenum">
               <a:t>12</a:t>
             </a:fld>
           </a:p>
@@ -5465,7 +5465,7 @@
         <p:spPr>
           <a:xfrm>
             <a:off x="576000" y="1306440"/>
-            <a:ext cx="8098200" cy="538200"/>
+            <a:ext cx="8097840" cy="537840"/>
           </a:xfrm>
           <a:prstGeom prst="rect">
             <a:avLst/>
@@ -5522,7 +5522,7 @@
         <p:spPr>
           <a:xfrm>
             <a:off x="0" y="1846440"/>
-            <a:ext cx="9141840" cy="2587320"/>
+            <a:ext cx="9141480" cy="2586960"/>
           </a:xfrm>
           <a:prstGeom prst="rect">
             <a:avLst/>
@@ -5541,7 +5541,7 @@
         <p:spPr>
           <a:xfrm>
             <a:off x="936000" y="4680000"/>
-            <a:ext cx="7198200" cy="718200"/>
+            <a:ext cx="7197840" cy="717840"/>
           </a:xfrm>
           <a:prstGeom prst="rect">
             <a:avLst/>
@@ -5598,7 +5598,7 @@
         <p:spPr>
           <a:xfrm>
             <a:off x="862200" y="5336640"/>
-            <a:ext cx="7318440" cy="718200"/>
+            <a:ext cx="7318080" cy="717840"/>
           </a:xfrm>
           <a:prstGeom prst="rect">
             <a:avLst/>
@@ -5617,7 +5617,7 @@
         <p:spPr>
           <a:xfrm>
             <a:off x="8730000" y="6431400"/>
-            <a:ext cx="484920" cy="426600"/>
+            <a:ext cx="484560" cy="426240"/>
           </a:xfrm>
           <a:prstGeom prst="rect">
             <a:avLst/>
@@ -5643,7 +5643,7 @@
                 <a:spcPct val="100000"/>
               </a:lnSpc>
             </a:pPr>
-            <a:fld id="{F7971E0A-B1B9-4DBC-8FFB-9CBF6613326D}" type="slidenum">
+            <a:fld id="{2988DD98-97DA-477A-9569-6F0CFA38E73E}" type="slidenum">
               <a:rPr b="0" lang="fr-FR" sz="2400" spc="-1" strike="noStrike">
                 <a:solidFill>
                   <a:srgbClr val="000000"/>
@@ -5675,7 +5675,7 @@
         <p:txBody>
           <a:bodyPr/>
           <a:p>
-            <a:fld id="{9C4B6F55-9AA9-4FE6-85BF-A900225EDB97}" type="slidenum">
+            <a:fld id="{3BC35935-DF7F-4C2D-B40E-260ED42C092F}" type="slidenum">
               <a:t>13</a:t>
             </a:fld>
           </a:p>
@@ -5720,7 +5720,7 @@
         <p:spPr>
           <a:xfrm>
             <a:off x="540000" y="900000"/>
-            <a:ext cx="2698200" cy="538200"/>
+            <a:ext cx="2697840" cy="537840"/>
           </a:xfrm>
           <a:prstGeom prst="rect">
             <a:avLst/>
@@ -5777,7 +5777,7 @@
         <p:spPr>
           <a:xfrm>
             <a:off x="25200" y="1474560"/>
-            <a:ext cx="9141840" cy="1281960"/>
+            <a:ext cx="9141480" cy="1281600"/>
           </a:xfrm>
           <a:prstGeom prst="rect">
             <a:avLst/>
@@ -5796,7 +5796,7 @@
         <p:spPr>
           <a:xfrm>
             <a:off x="8730000" y="6431400"/>
-            <a:ext cx="484920" cy="426600"/>
+            <a:ext cx="484560" cy="426240"/>
           </a:xfrm>
           <a:prstGeom prst="rect">
             <a:avLst/>
@@ -5822,7 +5822,7 @@
                 <a:spcPct val="100000"/>
               </a:lnSpc>
             </a:pPr>
-            <a:fld id="{49DEF915-5B3E-4309-AF4A-3D170F8A5C97}" type="slidenum">
+            <a:fld id="{E832E3BD-9919-4BCF-89C2-14EB24529887}" type="slidenum">
               <a:rPr b="0" lang="fr-FR" sz="2400" spc="-1" strike="noStrike">
                 <a:solidFill>
                   <a:srgbClr val="000000"/>
@@ -5854,7 +5854,7 @@
         <p:txBody>
           <a:bodyPr/>
           <a:p>
-            <a:fld id="{A51DD3F5-E6CF-4910-99C9-0989750272A8}" type="slidenum">
+            <a:fld id="{7AB5F81B-33CE-4A70-9A6C-E1AA0F1D70A6}" type="slidenum">
               <a:t>14</a:t>
             </a:fld>
           </a:p>
@@ -5899,7 +5899,7 @@
         <p:spPr>
           <a:xfrm>
             <a:off x="360000" y="900000"/>
-            <a:ext cx="4678200" cy="898200"/>
+            <a:ext cx="4677840" cy="897840"/>
           </a:xfrm>
           <a:prstGeom prst="rect">
             <a:avLst/>
@@ -5956,7 +5956,7 @@
         <p:spPr>
           <a:xfrm>
             <a:off x="442080" y="1908000"/>
-            <a:ext cx="3336120" cy="1978200"/>
+            <a:ext cx="3335760" cy="1977840"/>
           </a:xfrm>
           <a:prstGeom prst="rect">
             <a:avLst/>
@@ -5979,7 +5979,7 @@
         <p:spPr>
           <a:xfrm>
             <a:off x="5220000" y="1905480"/>
-            <a:ext cx="3238200" cy="1980720"/>
+            <a:ext cx="3237840" cy="1980360"/>
           </a:xfrm>
           <a:prstGeom prst="rect">
             <a:avLst/>
@@ -5998,7 +5998,7 @@
         <p:spPr>
           <a:xfrm>
             <a:off x="1800000" y="4140000"/>
-            <a:ext cx="4498200" cy="600480"/>
+            <a:ext cx="4497840" cy="600120"/>
           </a:xfrm>
           <a:prstGeom prst="rect">
             <a:avLst/>
@@ -6073,7 +6073,7 @@
         <p:spPr>
           <a:xfrm>
             <a:off x="360000" y="5040000"/>
-            <a:ext cx="5398200" cy="898200"/>
+            <a:ext cx="5397840" cy="897840"/>
           </a:xfrm>
           <a:prstGeom prst="rect">
             <a:avLst/>
@@ -6126,7 +6126,7 @@
         <p:spPr>
           <a:xfrm>
             <a:off x="8730000" y="6431400"/>
-            <a:ext cx="484920" cy="426600"/>
+            <a:ext cx="484560" cy="426240"/>
           </a:xfrm>
           <a:prstGeom prst="rect">
             <a:avLst/>
@@ -6152,7 +6152,7 @@
                 <a:spcPct val="100000"/>
               </a:lnSpc>
             </a:pPr>
-            <a:fld id="{8117E2E7-2D2D-4D18-8724-54E38DA944B0}" type="slidenum">
+            <a:fld id="{1AC003EF-43F7-40E3-AFF5-D487DC6124A9}" type="slidenum">
               <a:rPr b="0" lang="fr-FR" sz="2400" spc="-1" strike="noStrike">
                 <a:solidFill>
                   <a:srgbClr val="000000"/>
@@ -6184,7 +6184,7 @@
         <p:txBody>
           <a:bodyPr/>
           <a:p>
-            <a:fld id="{E6ED6E13-54F1-486E-98BD-58196D66E647}" type="slidenum">
+            <a:fld id="{47A8FE75-078E-48D0-B9AA-2C19D481FF8E}" type="slidenum">
               <a:t>15</a:t>
             </a:fld>
           </a:p>
@@ -6229,7 +6229,7 @@
         <p:spPr>
           <a:xfrm>
             <a:off x="363240" y="720000"/>
-            <a:ext cx="5578200" cy="600480"/>
+            <a:ext cx="5577840" cy="600120"/>
           </a:xfrm>
           <a:prstGeom prst="rect">
             <a:avLst/>
@@ -6286,7 +6286,7 @@
         <p:spPr>
           <a:xfrm>
             <a:off x="360000" y="1303200"/>
-            <a:ext cx="4501440" cy="1575000"/>
+            <a:ext cx="4501080" cy="1574640"/>
           </a:xfrm>
           <a:prstGeom prst="rect">
             <a:avLst/>
@@ -6305,7 +6305,7 @@
         <p:spPr>
           <a:xfrm>
             <a:off x="4863240" y="1800000"/>
-            <a:ext cx="3238200" cy="358200"/>
+            <a:ext cx="3237840" cy="357840"/>
           </a:xfrm>
           <a:prstGeom prst="rect">
             <a:avLst/>
@@ -6371,7 +6371,7 @@
         <p:spPr>
           <a:xfrm>
             <a:off x="363240" y="3240000"/>
-            <a:ext cx="4713480" cy="2158200"/>
+            <a:ext cx="4713120" cy="2157840"/>
           </a:xfrm>
           <a:prstGeom prst="rect">
             <a:avLst/>
@@ -6390,7 +6390,7 @@
         <p:spPr>
           <a:xfrm>
             <a:off x="5078520" y="4140000"/>
-            <a:ext cx="3238200" cy="600480"/>
+            <a:ext cx="3237840" cy="600120"/>
           </a:xfrm>
           <a:prstGeom prst="rect">
             <a:avLst/>
@@ -6452,7 +6452,7 @@
         <p:spPr>
           <a:xfrm>
             <a:off x="540000" y="5493240"/>
-            <a:ext cx="8278200" cy="538200"/>
+            <a:ext cx="8277840" cy="537840"/>
           </a:xfrm>
           <a:prstGeom prst="rect">
             <a:avLst/>
@@ -6505,7 +6505,7 @@
         <p:spPr>
           <a:xfrm>
             <a:off x="8730000" y="6431400"/>
-            <a:ext cx="484920" cy="426600"/>
+            <a:ext cx="484560" cy="426240"/>
           </a:xfrm>
           <a:prstGeom prst="rect">
             <a:avLst/>
@@ -6531,7 +6531,7 @@
                 <a:spcPct val="100000"/>
               </a:lnSpc>
             </a:pPr>
-            <a:fld id="{51CBF4B9-6C8D-4AE1-830B-61B2B394C74F}" type="slidenum">
+            <a:fld id="{5EF140D5-3AC4-4DC2-B10E-DF3D838CDB14}" type="slidenum">
               <a:rPr b="0" lang="fr-FR" sz="2400" spc="-1" strike="noStrike">
                 <a:solidFill>
                   <a:srgbClr val="000000"/>
@@ -6563,7 +6563,7 @@
         <p:txBody>
           <a:bodyPr/>
           <a:p>
-            <a:fld id="{2080670B-B19A-4C92-875E-2E9B517777C7}" type="slidenum">
+            <a:fld id="{71FB7988-3C18-481B-BD0E-B4CEEDDA59A5}" type="slidenum">
               <a:t>16</a:t>
             </a:fld>
           </a:p>
@@ -6608,7 +6608,7 @@
         <p:spPr>
           <a:xfrm>
             <a:off x="900000" y="1062360"/>
-            <a:ext cx="7198200" cy="4695840"/>
+            <a:ext cx="7197840" cy="4695480"/>
           </a:xfrm>
           <a:prstGeom prst="rect">
             <a:avLst/>
@@ -6954,7 +6954,7 @@
         <p:spPr>
           <a:xfrm>
             <a:off x="8730000" y="6431400"/>
-            <a:ext cx="484920" cy="426600"/>
+            <a:ext cx="484560" cy="426240"/>
           </a:xfrm>
           <a:prstGeom prst="rect">
             <a:avLst/>
@@ -6980,7 +6980,7 @@
                 <a:spcPct val="100000"/>
               </a:lnSpc>
             </a:pPr>
-            <a:fld id="{119EC528-6021-4148-9F92-B827D790B31F}" type="slidenum">
+            <a:fld id="{FCD22AE6-A501-4915-8DFD-5254276F461F}" type="slidenum">
               <a:rPr b="0" lang="fr-FR" sz="2400" spc="-1" strike="noStrike">
                 <a:solidFill>
                   <a:srgbClr val="000000"/>
@@ -7012,7 +7012,7 @@
         <p:txBody>
           <a:bodyPr/>
           <a:p>
-            <a:fld id="{23EABB3F-7D8D-41E4-87B3-56B00E33E150}" type="slidenum">
+            <a:fld id="{A949094E-E2F0-4518-8836-01B1FEF54535}" type="slidenum">
               <a:t>17</a:t>
             </a:fld>
           </a:p>
@@ -7061,7 +7061,7 @@
         <p:spPr>
           <a:xfrm>
             <a:off x="288000" y="1800000"/>
-            <a:ext cx="3405240" cy="1978200"/>
+            <a:ext cx="3404880" cy="1977840"/>
           </a:xfrm>
           <a:prstGeom prst="rect">
             <a:avLst/>
@@ -7080,7 +7080,7 @@
         <p:spPr>
           <a:xfrm>
             <a:off x="3816000" y="2592000"/>
-            <a:ext cx="1618200" cy="718200"/>
+            <a:ext cx="1617840" cy="717840"/>
           </a:xfrm>
           <a:prstGeom prst="rightArrow">
             <a:avLst>
@@ -7135,7 +7135,7 @@
         <p:spPr>
           <a:xfrm>
             <a:off x="5488920" y="1810440"/>
-            <a:ext cx="3617280" cy="1967760"/>
+            <a:ext cx="3616920" cy="1967400"/>
           </a:xfrm>
           <a:prstGeom prst="rect">
             <a:avLst/>
@@ -7158,7 +7158,7 @@
         <p:spPr>
           <a:xfrm>
             <a:off x="396000" y="4032000"/>
-            <a:ext cx="3238200" cy="1944000"/>
+            <a:ext cx="3237840" cy="1943640"/>
           </a:xfrm>
           <a:prstGeom prst="rect">
             <a:avLst/>
@@ -7177,7 +7177,7 @@
         <p:spPr>
           <a:xfrm>
             <a:off x="3816000" y="4716000"/>
-            <a:ext cx="1618200" cy="718200"/>
+            <a:ext cx="1617840" cy="717840"/>
           </a:xfrm>
           <a:prstGeom prst="rightArrow">
             <a:avLst>
@@ -7232,7 +7232,7 @@
         <p:spPr>
           <a:xfrm>
             <a:off x="5575320" y="4032000"/>
-            <a:ext cx="3388680" cy="1978200"/>
+            <a:ext cx="3388320" cy="1977840"/>
           </a:xfrm>
           <a:prstGeom prst="rect">
             <a:avLst/>
@@ -7251,7 +7251,7 @@
         <p:spPr>
           <a:xfrm>
             <a:off x="360000" y="648000"/>
-            <a:ext cx="8638560" cy="1112760"/>
+            <a:ext cx="8638200" cy="1112400"/>
           </a:xfrm>
           <a:prstGeom prst="rect">
             <a:avLst/>
@@ -7370,7 +7370,7 @@
         <p:spPr>
           <a:xfrm>
             <a:off x="8730000" y="6431400"/>
-            <a:ext cx="484920" cy="426600"/>
+            <a:ext cx="484560" cy="426240"/>
           </a:xfrm>
           <a:prstGeom prst="rect">
             <a:avLst/>
@@ -7396,7 +7396,7 @@
                 <a:spcPct val="100000"/>
               </a:lnSpc>
             </a:pPr>
-            <a:fld id="{A00E7E2D-3BC1-445F-BDE4-339163C225A6}" type="slidenum">
+            <a:fld id="{750E6B95-27F8-408A-9F59-81CBA13F772F}" type="slidenum">
               <a:rPr b="0" lang="fr-FR" sz="2400" spc="-1" strike="noStrike">
                 <a:solidFill>
                   <a:srgbClr val="000000"/>
@@ -7428,7 +7428,7 @@
         <p:txBody>
           <a:bodyPr/>
           <a:p>
-            <a:fld id="{A61DB406-14B3-4D11-853D-6868DDF349A8}" type="slidenum">
+            <a:fld id="{DD0AE8EA-B6E7-417C-A223-724824D99084}" type="slidenum">
               <a:t>18</a:t>
             </a:fld>
           </a:p>
@@ -7477,7 +7477,7 @@
         <p:spPr>
           <a:xfrm>
             <a:off x="36000" y="36000"/>
-            <a:ext cx="5002200" cy="2958480"/>
+            <a:ext cx="5001840" cy="2958120"/>
           </a:xfrm>
           <a:prstGeom prst="rect">
             <a:avLst/>
@@ -7500,7 +7500,7 @@
         <p:spPr>
           <a:xfrm>
             <a:off x="3780000" y="3017880"/>
-            <a:ext cx="5218200" cy="3042000"/>
+            <a:ext cx="5217840" cy="3041640"/>
           </a:xfrm>
           <a:prstGeom prst="rect">
             <a:avLst/>
@@ -7519,7 +7519,7 @@
         <p:spPr>
           <a:xfrm>
             <a:off x="8730000" y="6431400"/>
-            <a:ext cx="484920" cy="426600"/>
+            <a:ext cx="484560" cy="426240"/>
           </a:xfrm>
           <a:prstGeom prst="rect">
             <a:avLst/>
@@ -7545,7 +7545,7 @@
                 <a:spcPct val="100000"/>
               </a:lnSpc>
             </a:pPr>
-            <a:fld id="{2A737FC3-BA92-4E59-BB1F-3D5FE85EBD37}" type="slidenum">
+            <a:fld id="{E64A44D1-7025-471F-B1BE-2DBAD3026D7C}" type="slidenum">
               <a:rPr b="0" lang="fr-FR" sz="2400" spc="-1" strike="noStrike">
                 <a:solidFill>
                   <a:srgbClr val="000000"/>
@@ -7577,7 +7577,7 @@
         <p:txBody>
           <a:bodyPr/>
           <a:p>
-            <a:fld id="{8254AC34-A22E-4929-A028-11ABFFF91395}" type="slidenum">
+            <a:fld id="{939FE0BF-7D2A-49AF-8820-590B30D26C64}" type="slidenum">
               <a:t>19</a:t>
             </a:fld>
           </a:p>
@@ -7622,7 +7622,7 @@
         <p:spPr>
           <a:xfrm>
             <a:off x="610920" y="6134760"/>
-            <a:ext cx="5758200" cy="427680"/>
+            <a:ext cx="5757840" cy="427320"/>
           </a:xfrm>
           <a:prstGeom prst="rect">
             <a:avLst/>
@@ -7683,7 +7683,7 @@
         <p:spPr>
           <a:xfrm>
             <a:off x="467640" y="5301360"/>
-            <a:ext cx="5109480" cy="752760"/>
+            <a:ext cx="5109120" cy="752400"/>
           </a:xfrm>
           <a:prstGeom prst="rect">
             <a:avLst/>
@@ -7752,7 +7752,7 @@
         <p:spPr>
           <a:xfrm>
             <a:off x="1925640" y="748080"/>
-            <a:ext cx="5289480" cy="5289480"/>
+            <a:ext cx="5289120" cy="5289120"/>
           </a:xfrm>
           <a:prstGeom prst="rect">
             <a:avLst/>
@@ -7814,7 +7814,7 @@
         <p:spPr>
           <a:xfrm>
             <a:off x="467640" y="1556640"/>
-            <a:ext cx="8205840" cy="2949120"/>
+            <a:ext cx="8205480" cy="2948760"/>
           </a:xfrm>
           <a:prstGeom prst="rect">
             <a:avLst/>
@@ -7927,7 +7927,7 @@
         <p:spPr>
           <a:xfrm>
             <a:off x="6087240" y="5121720"/>
-            <a:ext cx="2909880" cy="768600"/>
+            <a:ext cx="2909520" cy="768240"/>
           </a:xfrm>
           <a:prstGeom prst="rect">
             <a:avLst/>
@@ -8026,7 +8026,7 @@
         <p:spPr>
           <a:xfrm>
             <a:off x="8820000" y="6430680"/>
-            <a:ext cx="378360" cy="426600"/>
+            <a:ext cx="378000" cy="426240"/>
           </a:xfrm>
           <a:prstGeom prst="rect">
             <a:avLst/>
@@ -8052,7 +8052,7 @@
                 <a:spcPct val="100000"/>
               </a:lnSpc>
             </a:pPr>
-            <a:fld id="{E9FE0C84-1100-43E6-B0D1-A3D7C9A910C3}" type="slidenum">
+            <a:fld id="{AD0309AB-8629-4090-B8FD-B3DDC348573F}" type="slidenum">
               <a:rPr b="0" lang="fr-FR" sz="2400" spc="-1" strike="noStrike">
                 <a:solidFill>
                   <a:srgbClr val="000000"/>
@@ -8084,7 +8084,7 @@
         <p:txBody>
           <a:bodyPr/>
           <a:p>
-            <a:fld id="{A5A2FC75-E632-470C-82B1-81588100A585}" type="slidenum">
+            <a:fld id="{895E9061-154B-470D-A6BF-E3017630EAF7}" type="slidenum">
               <a:t>2</a:t>
             </a:fld>
           </a:p>
@@ -8129,7 +8129,7 @@
         <p:spPr>
           <a:xfrm>
             <a:off x="360000" y="720000"/>
-            <a:ext cx="4498200" cy="1438200"/>
+            <a:ext cx="4497840" cy="1437840"/>
           </a:xfrm>
           <a:prstGeom prst="rect">
             <a:avLst/>
@@ -8264,7 +8264,7 @@
         <p:spPr>
           <a:xfrm>
             <a:off x="62640" y="2700000"/>
-            <a:ext cx="4435920" cy="3326400"/>
+            <a:ext cx="4435560" cy="3326040"/>
           </a:xfrm>
           <a:prstGeom prst="rect">
             <a:avLst/>
@@ -8287,7 +8287,7 @@
         <p:spPr>
           <a:xfrm>
             <a:off x="4608000" y="2700000"/>
-            <a:ext cx="4469400" cy="3351600"/>
+            <a:ext cx="4469040" cy="3351240"/>
           </a:xfrm>
           <a:prstGeom prst="rect">
             <a:avLst/>
@@ -8306,7 +8306,7 @@
         <p:spPr>
           <a:xfrm>
             <a:off x="8730000" y="6431400"/>
-            <a:ext cx="484920" cy="426600"/>
+            <a:ext cx="484560" cy="426240"/>
           </a:xfrm>
           <a:prstGeom prst="rect">
             <a:avLst/>
@@ -8332,7 +8332,7 @@
                 <a:spcPct val="100000"/>
               </a:lnSpc>
             </a:pPr>
-            <a:fld id="{17606CAB-C107-4A1D-821B-6111B97A30D8}" type="slidenum">
+            <a:fld id="{39B7AA12-DFA8-4DFB-B7DC-3AD28DD0F639}" type="slidenum">
               <a:rPr b="0" lang="fr-FR" sz="2400" spc="-1" strike="noStrike">
                 <a:solidFill>
                   <a:srgbClr val="000000"/>
@@ -8364,7 +8364,7 @@
         <p:txBody>
           <a:bodyPr/>
           <a:p>
-            <a:fld id="{AD901CDB-1BB9-472C-AF0A-5ED6437BEF01}" type="slidenum">
+            <a:fld id="{D6A5CABB-3D90-4CBD-BE7F-99E21519F973}" type="slidenum">
               <a:t>20</a:t>
             </a:fld>
           </a:p>
@@ -8409,7 +8409,7 @@
         <p:spPr>
           <a:xfrm>
             <a:off x="108000" y="828000"/>
-            <a:ext cx="4498560" cy="718560"/>
+            <a:ext cx="4498200" cy="718200"/>
           </a:xfrm>
           <a:prstGeom prst="rect">
             <a:avLst/>
@@ -8478,7 +8478,7 @@
         <p:spPr>
           <a:xfrm>
             <a:off x="866160" y="1542240"/>
-            <a:ext cx="7376400" cy="4425120"/>
+            <a:ext cx="7376040" cy="4424760"/>
           </a:xfrm>
           <a:prstGeom prst="rect">
             <a:avLst/>
@@ -8497,7 +8497,7 @@
         <p:spPr>
           <a:xfrm>
             <a:off x="5427720" y="720000"/>
-            <a:ext cx="3030840" cy="856800"/>
+            <a:ext cx="3030480" cy="856440"/>
           </a:xfrm>
           <a:prstGeom prst="rect">
             <a:avLst/>
@@ -8594,7 +8594,7 @@
         <p:spPr>
           <a:xfrm>
             <a:off x="8730000" y="6431400"/>
-            <a:ext cx="484920" cy="426600"/>
+            <a:ext cx="484560" cy="426240"/>
           </a:xfrm>
           <a:prstGeom prst="rect">
             <a:avLst/>
@@ -8620,7 +8620,7 @@
                 <a:spcPct val="100000"/>
               </a:lnSpc>
             </a:pPr>
-            <a:fld id="{396E7AB9-8417-46DC-B5CB-52A73AF1D05D}" type="slidenum">
+            <a:fld id="{94FACCBE-384F-46A1-A70C-90244A9CA8B2}" type="slidenum">
               <a:rPr b="0" lang="fr-FR" sz="2400" spc="-1" strike="noStrike">
                 <a:solidFill>
                   <a:srgbClr val="000000"/>
@@ -8652,7 +8652,7 @@
         <p:txBody>
           <a:bodyPr/>
           <a:p>
-            <a:fld id="{9B7C6430-9DD0-40FA-96B4-0E73F810874B}" type="slidenum">
+            <a:fld id="{C4978111-E83D-4D80-A1A1-BD4BA072D241}" type="slidenum">
               <a:t>21</a:t>
             </a:fld>
           </a:p>
@@ -8697,7 +8697,7 @@
         <p:spPr>
           <a:xfrm>
             <a:off x="1260000" y="1980000"/>
-            <a:ext cx="6477480" cy="3494160"/>
+            <a:ext cx="6477120" cy="3493800"/>
           </a:xfrm>
           <a:prstGeom prst="rect">
             <a:avLst/>
@@ -8764,7 +8764,7 @@
         <p:spPr>
           <a:xfrm>
             <a:off x="8730000" y="6431400"/>
-            <a:ext cx="484920" cy="426600"/>
+            <a:ext cx="484560" cy="426240"/>
           </a:xfrm>
           <a:prstGeom prst="rect">
             <a:avLst/>
@@ -8790,7 +8790,7 @@
                 <a:spcPct val="100000"/>
               </a:lnSpc>
             </a:pPr>
-            <a:fld id="{F9247878-A5D1-4244-9AD1-AC6EB0531A06}" type="slidenum">
+            <a:fld id="{F800500C-0A6E-4C3C-8086-C264558C95CA}" type="slidenum">
               <a:rPr b="0" lang="fr-FR" sz="2400" spc="-1" strike="noStrike">
                 <a:solidFill>
                   <a:srgbClr val="000000"/>
@@ -8822,7 +8822,7 @@
         <p:txBody>
           <a:bodyPr/>
           <a:p>
-            <a:fld id="{63E54501-76B1-4654-8166-FAB8942C9709}" type="slidenum">
+            <a:fld id="{EFFFFED3-65DF-4785-ADCA-C8802D07FDA9}" type="slidenum">
               <a:t>22</a:t>
             </a:fld>
           </a:p>
@@ -8871,7 +8871,7 @@
         <p:spPr>
           <a:xfrm>
             <a:off x="900000" y="1087560"/>
-            <a:ext cx="7079760" cy="4671360"/>
+            <a:ext cx="7079400" cy="4671000"/>
           </a:xfrm>
           <a:prstGeom prst="rect">
             <a:avLst/>
@@ -8890,7 +8890,7 @@
         <p:spPr>
           <a:xfrm>
             <a:off x="900000" y="720000"/>
-            <a:ext cx="5038920" cy="366480"/>
+            <a:ext cx="5038560" cy="366120"/>
           </a:xfrm>
           <a:prstGeom prst="rect">
             <a:avLst/>
@@ -8943,7 +8943,7 @@
         <p:spPr>
           <a:xfrm>
             <a:off x="8730000" y="6431400"/>
-            <a:ext cx="484920" cy="426600"/>
+            <a:ext cx="484560" cy="426240"/>
           </a:xfrm>
           <a:prstGeom prst="rect">
             <a:avLst/>
@@ -8969,7 +8969,7 @@
                 <a:spcPct val="100000"/>
               </a:lnSpc>
             </a:pPr>
-            <a:fld id="{C9C454E0-86F3-43E3-8C40-7064B947D1A8}" type="slidenum">
+            <a:fld id="{1FC899D9-777C-4D97-BD88-63247F1A6F61}" type="slidenum">
               <a:rPr b="0" lang="fr-FR" sz="2400" spc="-1" strike="noStrike">
                 <a:solidFill>
                   <a:srgbClr val="000000"/>
@@ -9001,7 +9001,7 @@
         <p:txBody>
           <a:bodyPr/>
           <a:p>
-            <a:fld id="{665388CC-41A4-432A-96B8-C2490AFCF3A5}" type="slidenum">
+            <a:fld id="{05909178-0D03-470C-B897-8A85F76C145F}" type="slidenum">
               <a:t>23</a:t>
             </a:fld>
           </a:p>
@@ -9046,7 +9046,7 @@
         <p:spPr>
           <a:xfrm>
             <a:off x="900000" y="720360"/>
-            <a:ext cx="5038920" cy="601200"/>
+            <a:ext cx="5038560" cy="600840"/>
           </a:xfrm>
           <a:prstGeom prst="rect">
             <a:avLst/>
@@ -9134,7 +9134,7 @@
         <p:spPr>
           <a:xfrm>
             <a:off x="1021320" y="1332000"/>
-            <a:ext cx="7221600" cy="4678920"/>
+            <a:ext cx="7221240" cy="4678560"/>
           </a:xfrm>
           <a:prstGeom prst="rect">
             <a:avLst/>
@@ -9153,7 +9153,7 @@
         <p:spPr>
           <a:xfrm>
             <a:off x="8730000" y="6431400"/>
-            <a:ext cx="484920" cy="426600"/>
+            <a:ext cx="484560" cy="426240"/>
           </a:xfrm>
           <a:prstGeom prst="rect">
             <a:avLst/>
@@ -9179,7 +9179,7 @@
                 <a:spcPct val="100000"/>
               </a:lnSpc>
             </a:pPr>
-            <a:fld id="{6C6E3A45-FB0D-42E0-AB4D-57F3E2B75C89}" type="slidenum">
+            <a:fld id="{56E5386B-EA25-499A-B424-3D05C0A157EA}" type="slidenum">
               <a:rPr b="0" lang="fr-FR" sz="2400" spc="-1" strike="noStrike">
                 <a:solidFill>
                   <a:srgbClr val="000000"/>
@@ -9211,7 +9211,7 @@
         <p:txBody>
           <a:bodyPr/>
           <a:p>
-            <a:fld id="{0084990D-D4CC-4526-98D9-D39319416457}" type="slidenum">
+            <a:fld id="{E28ECCBF-384B-4E5A-B43F-D4555C20CF0F}" type="slidenum">
               <a:t>24</a:t>
             </a:fld>
           </a:p>
@@ -9256,7 +9256,7 @@
         <p:spPr>
           <a:xfrm>
             <a:off x="360000" y="720000"/>
-            <a:ext cx="4138920" cy="358920"/>
+            <a:ext cx="4138560" cy="358560"/>
           </a:xfrm>
           <a:prstGeom prst="rect">
             <a:avLst/>
@@ -9313,7 +9313,7 @@
         <p:spPr>
           <a:xfrm>
             <a:off x="864000" y="1080000"/>
-            <a:ext cx="7556040" cy="5002920"/>
+            <a:ext cx="7555680" cy="5002560"/>
           </a:xfrm>
           <a:prstGeom prst="rect">
             <a:avLst/>
@@ -9332,7 +9332,7 @@
         <p:spPr>
           <a:xfrm>
             <a:off x="4680000" y="720000"/>
-            <a:ext cx="4138920" cy="358920"/>
+            <a:ext cx="4138560" cy="358560"/>
           </a:xfrm>
           <a:prstGeom prst="rect">
             <a:avLst/>
@@ -9385,7 +9385,7 @@
         <p:spPr>
           <a:xfrm>
             <a:off x="8730000" y="6431400"/>
-            <a:ext cx="484920" cy="426600"/>
+            <a:ext cx="484560" cy="426240"/>
           </a:xfrm>
           <a:prstGeom prst="rect">
             <a:avLst/>
@@ -9411,7 +9411,7 @@
                 <a:spcPct val="100000"/>
               </a:lnSpc>
             </a:pPr>
-            <a:fld id="{4719EF7F-A447-4083-B930-D8988159BEE0}" type="slidenum">
+            <a:fld id="{01D5B01F-C384-417C-B6B2-044137C449F6}" type="slidenum">
               <a:rPr b="0" lang="fr-FR" sz="2400" spc="-1" strike="noStrike">
                 <a:solidFill>
                   <a:srgbClr val="000000"/>
@@ -9443,7 +9443,7 @@
         <p:txBody>
           <a:bodyPr/>
           <a:p>
-            <a:fld id="{404F2692-F4DF-491D-9CB7-E72A8248F82D}" type="slidenum">
+            <a:fld id="{25F38D1E-082B-4E7C-B7A1-9A2D791449DF}" type="slidenum">
               <a:t>25</a:t>
             </a:fld>
           </a:p>
@@ -9488,7 +9488,7 @@
         <p:spPr>
           <a:xfrm>
             <a:off x="180000" y="720000"/>
-            <a:ext cx="5218920" cy="358920"/>
+            <a:ext cx="5218560" cy="358560"/>
           </a:xfrm>
           <a:prstGeom prst="rect">
             <a:avLst/>
@@ -9545,7 +9545,7 @@
         <p:spPr>
           <a:xfrm>
             <a:off x="756000" y="1044000"/>
-            <a:ext cx="7571520" cy="5065200"/>
+            <a:ext cx="7571160" cy="5064840"/>
           </a:xfrm>
           <a:prstGeom prst="rect">
             <a:avLst/>
@@ -9564,7 +9564,7 @@
         <p:spPr>
           <a:xfrm>
             <a:off x="8730000" y="6431400"/>
-            <a:ext cx="484920" cy="426600"/>
+            <a:ext cx="484560" cy="426240"/>
           </a:xfrm>
           <a:prstGeom prst="rect">
             <a:avLst/>
@@ -9590,7 +9590,7 @@
                 <a:spcPct val="100000"/>
               </a:lnSpc>
             </a:pPr>
-            <a:fld id="{E6F518A6-1048-4E30-B7D5-CE5E352CA6F2}" type="slidenum">
+            <a:fld id="{800CA9A1-EE88-45C9-931D-7BF97943724B}" type="slidenum">
               <a:rPr b="0" lang="fr-FR" sz="2400" spc="-1" strike="noStrike">
                 <a:solidFill>
                   <a:srgbClr val="000000"/>
@@ -9622,7 +9622,7 @@
         <p:txBody>
           <a:bodyPr/>
           <a:p>
-            <a:fld id="{B59C7FF7-F867-4D59-9F71-A68AC13C09C5}" type="slidenum">
+            <a:fld id="{86B921D6-5A06-4CE2-850E-CF6380FF5037}" type="slidenum">
               <a:t>26</a:t>
             </a:fld>
           </a:p>
@@ -9671,7 +9671,7 @@
         <p:spPr>
           <a:xfrm>
             <a:off x="1480320" y="900000"/>
-            <a:ext cx="5538600" cy="2071080"/>
+            <a:ext cx="5538240" cy="2070720"/>
           </a:xfrm>
           <a:prstGeom prst="rect">
             <a:avLst/>
@@ -9690,7 +9690,7 @@
         <p:spPr>
           <a:xfrm>
             <a:off x="259560" y="3420000"/>
-            <a:ext cx="8883360" cy="1625400"/>
+            <a:ext cx="8883000" cy="1625040"/>
           </a:xfrm>
           <a:prstGeom prst="rect">
             <a:avLst/>
@@ -9813,7 +9813,7 @@
         <p:spPr>
           <a:xfrm>
             <a:off x="8730000" y="6431400"/>
-            <a:ext cx="484920" cy="426600"/>
+            <a:ext cx="484560" cy="426240"/>
           </a:xfrm>
           <a:prstGeom prst="rect">
             <a:avLst/>
@@ -9839,7 +9839,7 @@
                 <a:spcPct val="100000"/>
               </a:lnSpc>
             </a:pPr>
-            <a:fld id="{B4AFDCC8-8F25-4DEF-B498-92B664959164}" type="slidenum">
+            <a:fld id="{A6C8A03C-4315-4622-9387-DDC05753851D}" type="slidenum">
               <a:rPr b="0" lang="fr-FR" sz="2400" spc="-1" strike="noStrike">
                 <a:solidFill>
                   <a:srgbClr val="000000"/>
@@ -9871,7 +9871,7 @@
         <p:txBody>
           <a:bodyPr/>
           <a:p>
-            <a:fld id="{74CE58A4-F329-44F8-BC7D-12F8F24DB5E4}" type="slidenum">
+            <a:fld id="{BBA05FDC-B720-4867-9C90-A6270287D9F4}" type="slidenum">
               <a:t>27</a:t>
             </a:fld>
           </a:p>
@@ -9916,7 +9916,7 @@
         <p:spPr>
           <a:xfrm>
             <a:off x="1260000" y="5220000"/>
-            <a:ext cx="4498920" cy="898920"/>
+            <a:ext cx="4498560" cy="898560"/>
           </a:xfrm>
           <a:prstGeom prst="rect">
             <a:avLst/>
@@ -9969,7 +9969,7 @@
         <p:spPr>
           <a:xfrm>
             <a:off x="8730000" y="6431400"/>
-            <a:ext cx="484920" cy="426600"/>
+            <a:ext cx="484560" cy="426240"/>
           </a:xfrm>
           <a:prstGeom prst="rect">
             <a:avLst/>
@@ -9995,7 +9995,7 @@
                 <a:spcPct val="100000"/>
               </a:lnSpc>
             </a:pPr>
-            <a:fld id="{3E05B7EB-BB20-41DC-8ACA-826D75284350}" type="slidenum">
+            <a:fld id="{D2E12669-72A0-4B66-B5C8-B54AE1EDF8E9}" type="slidenum">
               <a:rPr b="0" lang="fr-FR" sz="2400" spc="-1" strike="noStrike">
                 <a:solidFill>
                   <a:srgbClr val="000000"/>
@@ -10026,7 +10026,7 @@
         <p:spPr>
           <a:xfrm>
             <a:off x="360000" y="690480"/>
-            <a:ext cx="7019280" cy="4386600"/>
+            <a:ext cx="7018920" cy="4386240"/>
           </a:xfrm>
           <a:prstGeom prst="rect">
             <a:avLst/>
@@ -10050,7 +10050,7 @@
         <p:txBody>
           <a:bodyPr/>
           <a:p>
-            <a:fld id="{2F637065-B80C-4BE3-B6DD-CE4B9B43DCC8}" type="slidenum">
+            <a:fld id="{C03B958C-FD16-4038-88FD-7E78D68791E8}" type="slidenum">
               <a:t>28</a:t>
             </a:fld>
           </a:p>
@@ -10095,7 +10095,7 @@
         <p:spPr>
           <a:xfrm>
             <a:off x="8730000" y="6431400"/>
-            <a:ext cx="484920" cy="426600"/>
+            <a:ext cx="484560" cy="426240"/>
           </a:xfrm>
           <a:prstGeom prst="rect">
             <a:avLst/>
@@ -10121,7 +10121,7 @@
                 <a:spcPct val="100000"/>
               </a:lnSpc>
             </a:pPr>
-            <a:fld id="{B62DED38-444F-4F1D-9E56-4ABEA5C49C5D}" type="slidenum">
+            <a:fld id="{6DB70861-CEF8-4CEB-BA50-20FF7179AE17}" type="slidenum">
               <a:rPr b="0" lang="fr-FR" sz="2400" spc="-1" strike="noStrike">
                 <a:solidFill>
                   <a:srgbClr val="000000"/>
@@ -10152,7 +10152,7 @@
         <p:spPr>
           <a:xfrm>
             <a:off x="443520" y="644040"/>
-            <a:ext cx="8087760" cy="5391360"/>
+            <a:ext cx="8087400" cy="5391000"/>
           </a:xfrm>
           <a:prstGeom prst="rect">
             <a:avLst/>
@@ -10176,7 +10176,7 @@
         <p:txBody>
           <a:bodyPr/>
           <a:p>
-            <a:fld id="{2258753B-3E46-4085-A10D-559654C37139}" type="slidenum">
+            <a:fld id="{D6D758AE-02CE-4F68-B7CD-E3BCB09C5283}" type="slidenum">
               <a:t>29</a:t>
             </a:fld>
           </a:p>
@@ -10225,7 +10225,7 @@
         <p:spPr>
           <a:xfrm>
             <a:off x="1008000" y="260280"/>
-            <a:ext cx="7845480" cy="357120"/>
+            <a:ext cx="7845120" cy="356760"/>
           </a:xfrm>
           <a:prstGeom prst="rect">
             <a:avLst/>
@@ -10281,7 +10281,7 @@
         <p:spPr>
           <a:xfrm>
             <a:off x="107640" y="1260000"/>
-            <a:ext cx="2949480" cy="1104480"/>
+            <a:ext cx="2949120" cy="1104120"/>
           </a:xfrm>
           <a:prstGeom prst="rect">
             <a:avLst/>
@@ -10386,7 +10386,7 @@
         <p:spPr>
           <a:xfrm>
             <a:off x="2880000" y="1260000"/>
-            <a:ext cx="3417120" cy="897120"/>
+            <a:ext cx="3416760" cy="896760"/>
           </a:xfrm>
           <a:prstGeom prst="ellipse">
             <a:avLst/>
@@ -10484,7 +10484,7 @@
         <p:spPr>
           <a:xfrm>
             <a:off x="2880000" y="2700000"/>
-            <a:ext cx="3597120" cy="897120"/>
+            <a:ext cx="3596760" cy="896760"/>
           </a:xfrm>
           <a:prstGeom prst="ellipse">
             <a:avLst/>
@@ -10553,7 +10553,7 @@
         <p:spPr>
           <a:xfrm>
             <a:off x="4680000" y="2244600"/>
-            <a:ext cx="3057120" cy="357120"/>
+            <a:ext cx="3056760" cy="356760"/>
           </a:xfrm>
           <a:prstGeom prst="rect">
             <a:avLst/>
@@ -10647,7 +10647,7 @@
         <p:spPr>
           <a:xfrm>
             <a:off x="2880000" y="4680000"/>
-            <a:ext cx="3597120" cy="897120"/>
+            <a:ext cx="3596760" cy="896760"/>
           </a:xfrm>
           <a:prstGeom prst="ellipse">
             <a:avLst/>
@@ -10716,7 +10716,7 @@
         <p:spPr>
           <a:xfrm>
             <a:off x="4860000" y="3600000"/>
-            <a:ext cx="3957120" cy="1257120"/>
+            <a:ext cx="3956760" cy="1256760"/>
           </a:xfrm>
           <a:prstGeom prst="rect">
             <a:avLst/>
@@ -10807,7 +10807,7 @@
         <p:spPr>
           <a:xfrm>
             <a:off x="565560" y="3564000"/>
-            <a:ext cx="3067560" cy="1177920"/>
+            <a:ext cx="3067200" cy="1177560"/>
           </a:xfrm>
           <a:prstGeom prst="rect">
             <a:avLst/>
@@ -10826,7 +10826,7 @@
         <p:spPr>
           <a:xfrm>
             <a:off x="8820000" y="6430680"/>
-            <a:ext cx="378360" cy="426600"/>
+            <a:ext cx="378000" cy="426240"/>
           </a:xfrm>
           <a:prstGeom prst="rect">
             <a:avLst/>
@@ -10852,7 +10852,7 @@
                 <a:spcPct val="100000"/>
               </a:lnSpc>
             </a:pPr>
-            <a:fld id="{19643694-1343-4985-ACD1-D84C2341799E}" type="slidenum">
+            <a:fld id="{A0BC3014-1956-48C7-8274-4581BC322510}" type="slidenum">
               <a:rPr b="0" lang="fr-FR" sz="2400" spc="-1" strike="noStrike">
                 <a:solidFill>
                   <a:srgbClr val="000000"/>
@@ -10884,7 +10884,7 @@
         <p:txBody>
           <a:bodyPr/>
           <a:p>
-            <a:fld id="{908B7281-7999-409F-8D6A-8CC03657B403}" type="slidenum">
+            <a:fld id="{86B05482-8695-464D-9612-CA8318FEE517}" type="slidenum">
               <a:t>3</a:t>
             </a:fld>
           </a:p>
@@ -10929,7 +10929,7 @@
         <p:spPr>
           <a:xfrm>
             <a:off x="180000" y="720000"/>
-            <a:ext cx="2518920" cy="358920"/>
+            <a:ext cx="2518560" cy="358560"/>
           </a:xfrm>
           <a:prstGeom prst="rect">
             <a:avLst/>
@@ -10986,7 +10986,7 @@
         <p:spPr>
           <a:xfrm>
             <a:off x="540000" y="1395000"/>
-            <a:ext cx="3958920" cy="1798920"/>
+            <a:ext cx="3958560" cy="1798560"/>
           </a:xfrm>
           <a:prstGeom prst="rect">
             <a:avLst/>
@@ -11009,7 +11009,7 @@
         <p:spPr>
           <a:xfrm>
             <a:off x="540000" y="3600000"/>
-            <a:ext cx="3958920" cy="1798920"/>
+            <a:ext cx="3958560" cy="1798560"/>
           </a:xfrm>
           <a:prstGeom prst="rect">
             <a:avLst/>
@@ -11032,7 +11032,7 @@
         <p:spPr>
           <a:xfrm>
             <a:off x="4860000" y="2340000"/>
-            <a:ext cx="3958920" cy="1798920"/>
+            <a:ext cx="3958560" cy="1798560"/>
           </a:xfrm>
           <a:prstGeom prst="rect">
             <a:avLst/>
@@ -11051,7 +11051,7 @@
         <p:spPr>
           <a:xfrm>
             <a:off x="8730000" y="6431400"/>
-            <a:ext cx="484920" cy="426600"/>
+            <a:ext cx="484560" cy="426240"/>
           </a:xfrm>
           <a:prstGeom prst="rect">
             <a:avLst/>
@@ -11077,7 +11077,7 @@
                 <a:spcPct val="100000"/>
               </a:lnSpc>
             </a:pPr>
-            <a:fld id="{ACF487DA-14CA-42D4-9F0C-3223C4ADC718}" type="slidenum">
+            <a:fld id="{94364177-381F-402C-94AC-4CA03A32237D}" type="slidenum">
               <a:rPr b="0" lang="fr-FR" sz="2400" spc="-1" strike="noStrike">
                 <a:solidFill>
                   <a:srgbClr val="000000"/>
@@ -11109,7 +11109,7 @@
         <p:txBody>
           <a:bodyPr/>
           <a:p>
-            <a:fld id="{DE4771F0-36EC-4AF3-A5A4-20E57152B775}" type="slidenum">
+            <a:fld id="{611D1DCA-C48D-495F-9658-362AC79E653D}" type="slidenum">
               <a:t>30</a:t>
             </a:fld>
           </a:p>
@@ -11158,7 +11158,7 @@
         <p:spPr>
           <a:xfrm>
             <a:off x="540000" y="1209960"/>
-            <a:ext cx="7527600" cy="1308960"/>
+            <a:ext cx="7527240" cy="1308600"/>
           </a:xfrm>
           <a:prstGeom prst="rect">
             <a:avLst/>
@@ -11181,7 +11181,7 @@
         <p:spPr>
           <a:xfrm>
             <a:off x="540000" y="2971080"/>
-            <a:ext cx="7710480" cy="1354680"/>
+            <a:ext cx="7710120" cy="1354320"/>
           </a:xfrm>
           <a:prstGeom prst="rect">
             <a:avLst/>
@@ -11200,7 +11200,7 @@
         <p:spPr>
           <a:xfrm>
             <a:off x="540000" y="900000"/>
-            <a:ext cx="3958920" cy="345240"/>
+            <a:ext cx="3958560" cy="344880"/>
           </a:xfrm>
           <a:prstGeom prst="rect">
             <a:avLst/>
@@ -11253,7 +11253,7 @@
         <p:spPr>
           <a:xfrm>
             <a:off x="540000" y="2624760"/>
-            <a:ext cx="2518920" cy="345240"/>
+            <a:ext cx="2518560" cy="344880"/>
           </a:xfrm>
           <a:prstGeom prst="rect">
             <a:avLst/>
@@ -11306,7 +11306,7 @@
         <p:spPr>
           <a:xfrm>
             <a:off x="540000" y="4513680"/>
-            <a:ext cx="3058920" cy="345240"/>
+            <a:ext cx="3058560" cy="344880"/>
           </a:xfrm>
           <a:prstGeom prst="rect">
             <a:avLst/>
@@ -11363,7 +11363,7 @@
         <p:spPr>
           <a:xfrm>
             <a:off x="0" y="4860000"/>
-            <a:ext cx="9142560" cy="1155960"/>
+            <a:ext cx="9142200" cy="1155600"/>
           </a:xfrm>
           <a:prstGeom prst="rect">
             <a:avLst/>
@@ -11382,7 +11382,7 @@
         <p:spPr>
           <a:xfrm>
             <a:off x="180000" y="589680"/>
-            <a:ext cx="3958920" cy="345240"/>
+            <a:ext cx="3958560" cy="344880"/>
           </a:xfrm>
           <a:prstGeom prst="rect">
             <a:avLst/>
@@ -11435,7 +11435,7 @@
         <p:spPr>
           <a:xfrm>
             <a:off x="8730000" y="6431400"/>
-            <a:ext cx="484920" cy="426600"/>
+            <a:ext cx="484560" cy="426240"/>
           </a:xfrm>
           <a:prstGeom prst="rect">
             <a:avLst/>
@@ -11461,7 +11461,7 @@
                 <a:spcPct val="100000"/>
               </a:lnSpc>
             </a:pPr>
-            <a:fld id="{6E33E49F-BCFF-4E7C-ADD2-0B3AE3A01247}" type="slidenum">
+            <a:fld id="{9C617543-CC0B-40B6-8BA7-CB1E896D30D4}" type="slidenum">
               <a:rPr b="0" lang="fr-FR" sz="2400" spc="-1" strike="noStrike">
                 <a:solidFill>
                   <a:srgbClr val="000000"/>
@@ -11493,7 +11493,7 @@
         <p:txBody>
           <a:bodyPr/>
           <a:p>
-            <a:fld id="{0F31437A-5776-4905-8A58-1BAF165A8C5B}" type="slidenum">
+            <a:fld id="{A0F62C75-D639-4829-B4DB-B7F690703B3B}" type="slidenum">
               <a:t>31</a:t>
             </a:fld>
           </a:p>
@@ -11538,7 +11538,7 @@
         <p:spPr>
           <a:xfrm>
             <a:off x="432360" y="900360"/>
-            <a:ext cx="2518560" cy="358560"/>
+            <a:ext cx="2518200" cy="358200"/>
           </a:xfrm>
           <a:prstGeom prst="rect">
             <a:avLst/>
@@ -11592,7 +11592,7 @@
         <p:spPr>
           <a:xfrm>
             <a:off x="432360" y="2517120"/>
-            <a:ext cx="2158560" cy="361800"/>
+            <a:ext cx="2158200" cy="361440"/>
           </a:xfrm>
           <a:prstGeom prst="rect">
             <a:avLst/>
@@ -11649,7 +11649,7 @@
         <p:spPr>
           <a:xfrm>
             <a:off x="66960" y="1260000"/>
-            <a:ext cx="8967960" cy="1042560"/>
+            <a:ext cx="8967600" cy="1042200"/>
           </a:xfrm>
           <a:prstGeom prst="rect">
             <a:avLst/>
@@ -11672,7 +11672,7 @@
         <p:spPr>
           <a:xfrm>
             <a:off x="93600" y="2946960"/>
-            <a:ext cx="9006120" cy="1042560"/>
+            <a:ext cx="9005760" cy="1042200"/>
           </a:xfrm>
           <a:prstGeom prst="rect">
             <a:avLst/>
@@ -11695,7 +11695,7 @@
         <p:spPr>
           <a:xfrm>
             <a:off x="36360" y="4579920"/>
-            <a:ext cx="9142560" cy="999000"/>
+            <a:ext cx="9142200" cy="998640"/>
           </a:xfrm>
           <a:prstGeom prst="rect">
             <a:avLst/>
@@ -11714,7 +11714,7 @@
         <p:spPr>
           <a:xfrm>
             <a:off x="324000" y="4189680"/>
-            <a:ext cx="2554920" cy="389160"/>
+            <a:ext cx="2554560" cy="388800"/>
           </a:xfrm>
           <a:prstGeom prst="rect">
             <a:avLst/>
@@ -11767,7 +11767,7 @@
         <p:spPr>
           <a:xfrm>
             <a:off x="3240000" y="720000"/>
-            <a:ext cx="3598920" cy="358920"/>
+            <a:ext cx="3598560" cy="358560"/>
           </a:xfrm>
           <a:prstGeom prst="rect">
             <a:avLst/>
@@ -11821,7 +11821,7 @@
         <p:spPr>
           <a:xfrm>
             <a:off x="8730000" y="6431400"/>
-            <a:ext cx="484920" cy="426600"/>
+            <a:ext cx="484560" cy="426240"/>
           </a:xfrm>
           <a:prstGeom prst="rect">
             <a:avLst/>
@@ -11847,7 +11847,7 @@
                 <a:spcPct val="100000"/>
               </a:lnSpc>
             </a:pPr>
-            <a:fld id="{C4F3B6E3-7D94-4981-8ADF-4EF8555E6D80}" type="slidenum">
+            <a:fld id="{41A55E97-751C-4BB2-BC95-02F0CFDD15F6}" type="slidenum">
               <a:rPr b="0" lang="fr-FR" sz="2400" spc="-1" strike="noStrike">
                 <a:solidFill>
                   <a:srgbClr val="000000"/>
@@ -11879,7 +11879,7 @@
         <p:txBody>
           <a:bodyPr/>
           <a:p>
-            <a:fld id="{1CC00943-22B9-42AE-8428-2B6970A9C6BF}" type="slidenum">
+            <a:fld id="{DBEE8CAD-DB0F-4B79-897B-D277162E5B68}" type="slidenum">
               <a:t>32</a:t>
             </a:fld>
           </a:p>
@@ -11924,7 +11924,7 @@
         <p:spPr>
           <a:xfrm>
             <a:off x="360000" y="720000"/>
-            <a:ext cx="2698920" cy="358920"/>
+            <a:ext cx="2698560" cy="358560"/>
           </a:xfrm>
           <a:prstGeom prst="rect">
             <a:avLst/>
@@ -11981,7 +11981,7 @@
         <p:spPr>
           <a:xfrm>
             <a:off x="360" y="1159920"/>
-            <a:ext cx="9142560" cy="4419000"/>
+            <a:ext cx="9142200" cy="4418640"/>
           </a:xfrm>
           <a:prstGeom prst="rect">
             <a:avLst/>
@@ -12000,7 +12000,7 @@
         <p:spPr>
           <a:xfrm>
             <a:off x="8730000" y="6431400"/>
-            <a:ext cx="484920" cy="426600"/>
+            <a:ext cx="484560" cy="426240"/>
           </a:xfrm>
           <a:prstGeom prst="rect">
             <a:avLst/>
@@ -12026,7 +12026,7 @@
                 <a:spcPct val="100000"/>
               </a:lnSpc>
             </a:pPr>
-            <a:fld id="{9083F62F-C94F-4075-A5C8-CC943B09C933}" type="slidenum">
+            <a:fld id="{508EAB67-2097-44F5-8DFC-A3FE75CBB7F4}" type="slidenum">
               <a:rPr b="0" lang="fr-FR" sz="2400" spc="-1" strike="noStrike">
                 <a:solidFill>
                   <a:srgbClr val="000000"/>
@@ -12058,7 +12058,7 @@
         <p:txBody>
           <a:bodyPr/>
           <a:p>
-            <a:fld id="{C99B29BA-3210-46F5-8E7A-7CC5A12DF5AB}" type="slidenum">
+            <a:fld id="{FCE6E1AD-2540-4730-9B52-0D53B796EEC2}" type="slidenum">
               <a:t>33</a:t>
             </a:fld>
           </a:p>
@@ -12103,7 +12103,7 @@
         <p:spPr>
           <a:xfrm>
             <a:off x="1260000" y="1980000"/>
-            <a:ext cx="6477480" cy="3494160"/>
+            <a:ext cx="6477120" cy="3493800"/>
           </a:xfrm>
           <a:prstGeom prst="rect">
             <a:avLst/>
@@ -12170,7 +12170,7 @@
         <p:spPr>
           <a:xfrm>
             <a:off x="8695080" y="6431400"/>
-            <a:ext cx="484920" cy="426600"/>
+            <a:ext cx="484560" cy="426240"/>
           </a:xfrm>
           <a:prstGeom prst="rect">
             <a:avLst/>
@@ -12196,7 +12196,7 @@
                 <a:spcPct val="100000"/>
               </a:lnSpc>
             </a:pPr>
-            <a:fld id="{F54818E6-95FE-438B-B359-FC9003F879B2}" type="slidenum">
+            <a:fld id="{BC159080-6EC7-420A-B1FC-1A47AA7C8A44}" type="slidenum">
               <a:rPr b="0" lang="fr-FR" sz="2400" spc="-1" strike="noStrike">
                 <a:solidFill>
                   <a:srgbClr val="000000"/>
@@ -12228,7 +12228,7 @@
         <p:txBody>
           <a:bodyPr/>
           <a:p>
-            <a:fld id="{56C64075-BF41-4BE8-AABB-B27852128F4A}" type="slidenum">
+            <a:fld id="{0F8FC3B2-3F38-49C9-BAB6-58689B03EA41}" type="slidenum">
               <a:t>34</a:t>
             </a:fld>
           </a:p>
@@ -12277,7 +12277,7 @@
         <p:spPr>
           <a:xfrm>
             <a:off x="180000" y="1112760"/>
-            <a:ext cx="8794440" cy="4826880"/>
+            <a:ext cx="8794080" cy="4826520"/>
           </a:xfrm>
           <a:prstGeom prst="rect">
             <a:avLst/>
@@ -12296,7 +12296,7 @@
         <p:spPr>
           <a:xfrm>
             <a:off x="180000" y="720000"/>
-            <a:ext cx="2519640" cy="359640"/>
+            <a:ext cx="2519280" cy="359280"/>
           </a:xfrm>
           <a:prstGeom prst="rect">
             <a:avLst/>
@@ -12349,7 +12349,7 @@
         <p:spPr>
           <a:xfrm>
             <a:off x="8695080" y="6431400"/>
-            <a:ext cx="484920" cy="426600"/>
+            <a:ext cx="484560" cy="426240"/>
           </a:xfrm>
           <a:prstGeom prst="rect">
             <a:avLst/>
@@ -12375,7 +12375,7 @@
                 <a:spcPct val="100000"/>
               </a:lnSpc>
             </a:pPr>
-            <a:fld id="{4C8143FC-DF7A-42E4-B72E-4054DF1B5D2F}" type="slidenum">
+            <a:fld id="{853971C7-4F5E-48A3-82AC-047E0CD7C523}" type="slidenum">
               <a:rPr b="0" lang="fr-FR" sz="2400" spc="-1" strike="noStrike">
                 <a:solidFill>
                   <a:srgbClr val="000000"/>
@@ -12407,7 +12407,7 @@
         <p:txBody>
           <a:bodyPr/>
           <a:p>
-            <a:fld id="{019DD818-D03C-4590-9F71-C0CE123D799C}" type="slidenum">
+            <a:fld id="{4A776E00-688C-4631-82FF-BF5D825B1DF6}" type="slidenum">
               <a:t>35</a:t>
             </a:fld>
           </a:p>
@@ -12452,7 +12452,7 @@
         <p:spPr>
           <a:xfrm>
             <a:off x="180000" y="720000"/>
-            <a:ext cx="2519640" cy="359640"/>
+            <a:ext cx="2519280" cy="359280"/>
           </a:xfrm>
           <a:prstGeom prst="rect">
             <a:avLst/>
@@ -12509,7 +12509,7 @@
         <p:spPr>
           <a:xfrm>
             <a:off x="25200" y="1260000"/>
-            <a:ext cx="8974440" cy="3401280"/>
+            <a:ext cx="8974080" cy="3400920"/>
           </a:xfrm>
           <a:prstGeom prst="rect">
             <a:avLst/>
@@ -12528,7 +12528,7 @@
         <p:spPr>
           <a:xfrm>
             <a:off x="8695080" y="6431400"/>
-            <a:ext cx="484920" cy="426600"/>
+            <a:ext cx="484560" cy="426240"/>
           </a:xfrm>
           <a:prstGeom prst="rect">
             <a:avLst/>
@@ -12554,7 +12554,7 @@
                 <a:spcPct val="100000"/>
               </a:lnSpc>
             </a:pPr>
-            <a:fld id="{BE3109A1-A248-43E1-975E-664C206D72CD}" type="slidenum">
+            <a:fld id="{7F2CD5CF-8FA7-489E-877D-10E8BE7ABC68}" type="slidenum">
               <a:rPr b="0" lang="fr-FR" sz="2400" spc="-1" strike="noStrike">
                 <a:solidFill>
                   <a:srgbClr val="000000"/>
@@ -12586,7 +12586,7 @@
         <p:txBody>
           <a:bodyPr/>
           <a:p>
-            <a:fld id="{4E7A2ACD-2246-4906-9A00-98D8A970C348}" type="slidenum">
+            <a:fld id="{5509C3AD-B92D-4D6C-AB9E-BDC4C35D0A00}" type="slidenum">
               <a:t>36</a:t>
             </a:fld>
           </a:p>
@@ -12635,7 +12635,7 @@
         <p:spPr>
           <a:xfrm>
             <a:off x="51480" y="1080000"/>
-            <a:ext cx="9090720" cy="4434480"/>
+            <a:ext cx="9090360" cy="4434120"/>
           </a:xfrm>
           <a:prstGeom prst="rect">
             <a:avLst/>
@@ -12654,7 +12654,7 @@
         <p:spPr>
           <a:xfrm>
             <a:off x="180000" y="720000"/>
-            <a:ext cx="3419640" cy="359640"/>
+            <a:ext cx="3419280" cy="359280"/>
           </a:xfrm>
           <a:prstGeom prst="rect">
             <a:avLst/>
@@ -12708,7 +12708,7 @@
         <p:spPr>
           <a:xfrm>
             <a:off x="180000" y="5760000"/>
-            <a:ext cx="7199640" cy="359640"/>
+            <a:ext cx="7199280" cy="359280"/>
           </a:xfrm>
           <a:prstGeom prst="rect">
             <a:avLst/>
@@ -12761,7 +12761,7 @@
         <p:spPr>
           <a:xfrm>
             <a:off x="8695080" y="6431400"/>
-            <a:ext cx="484920" cy="426600"/>
+            <a:ext cx="484560" cy="426240"/>
           </a:xfrm>
           <a:prstGeom prst="rect">
             <a:avLst/>
@@ -12787,7 +12787,7 @@
                 <a:spcPct val="100000"/>
               </a:lnSpc>
             </a:pPr>
-            <a:fld id="{DD9A89A6-F7BA-4CF2-81B3-F65A3BC9D7C3}" type="slidenum">
+            <a:fld id="{DEF85A56-7904-4736-9CC5-359E714FB7FC}" type="slidenum">
               <a:rPr b="0" lang="fr-FR" sz="2400" spc="-1" strike="noStrike">
                 <a:solidFill>
                   <a:srgbClr val="000000"/>
@@ -12819,7 +12819,7 @@
         <p:txBody>
           <a:bodyPr/>
           <a:p>
-            <a:fld id="{306FDD2C-C5B0-4EA5-B70E-CC9EEAEEF747}" type="slidenum">
+            <a:fld id="{F809AC39-5CD4-4B7C-BC37-33D84888CCE1}" type="slidenum">
               <a:t>37</a:t>
             </a:fld>
           </a:p>
@@ -12868,7 +12868,7 @@
         <p:spPr>
           <a:xfrm>
             <a:off x="346320" y="1440000"/>
-            <a:ext cx="8473320" cy="3969360"/>
+            <a:ext cx="8472960" cy="3969000"/>
           </a:xfrm>
           <a:prstGeom prst="rect">
             <a:avLst/>
@@ -12887,7 +12887,7 @@
         <p:spPr>
           <a:xfrm>
             <a:off x="180000" y="720000"/>
-            <a:ext cx="2519640" cy="539640"/>
+            <a:ext cx="2519280" cy="539280"/>
           </a:xfrm>
           <a:prstGeom prst="rect">
             <a:avLst/>
@@ -12940,7 +12940,7 @@
         <p:spPr>
           <a:xfrm>
             <a:off x="8695080" y="6431400"/>
-            <a:ext cx="484920" cy="426600"/>
+            <a:ext cx="484560" cy="426240"/>
           </a:xfrm>
           <a:prstGeom prst="rect">
             <a:avLst/>
@@ -12966,7 +12966,7 @@
                 <a:spcPct val="100000"/>
               </a:lnSpc>
             </a:pPr>
-            <a:fld id="{C69119B8-7B80-43C9-9F36-5F33C6370947}" type="slidenum">
+            <a:fld id="{2E4C7A50-FD85-4D6A-AC96-4A93A75945C0}" type="slidenum">
               <a:rPr b="0" lang="fr-FR" sz="2400" spc="-1" strike="noStrike">
                 <a:solidFill>
                   <a:srgbClr val="000000"/>
@@ -12998,7 +12998,7 @@
         <p:txBody>
           <a:bodyPr/>
           <a:p>
-            <a:fld id="{448ACD7C-2F0D-44F5-B633-26CCB3C7221E}" type="slidenum">
+            <a:fld id="{AA2BE250-161C-4E01-87C1-1F9874257841}" type="slidenum">
               <a:t>38</a:t>
             </a:fld>
           </a:p>
@@ -13047,7 +13047,7 @@
         <p:spPr>
           <a:xfrm>
             <a:off x="132120" y="3600000"/>
-            <a:ext cx="4727520" cy="2325600"/>
+            <a:ext cx="4727160" cy="2325240"/>
           </a:xfrm>
           <a:prstGeom prst="rect">
             <a:avLst/>
@@ -13070,7 +13070,7 @@
         <p:spPr>
           <a:xfrm>
             <a:off x="3739680" y="900000"/>
-            <a:ext cx="5259960" cy="2159640"/>
+            <a:ext cx="5259600" cy="2159280"/>
           </a:xfrm>
           <a:prstGeom prst="rect">
             <a:avLst/>
@@ -13089,7 +13089,7 @@
         <p:spPr>
           <a:xfrm>
             <a:off x="1620000" y="1080000"/>
-            <a:ext cx="1979640" cy="539640"/>
+            <a:ext cx="1979280" cy="539280"/>
           </a:xfrm>
           <a:prstGeom prst="rect">
             <a:avLst/>
@@ -13142,7 +13142,7 @@
         <p:spPr>
           <a:xfrm>
             <a:off x="4860000" y="4140000"/>
-            <a:ext cx="2159640" cy="359640"/>
+            <a:ext cx="2159280" cy="359280"/>
           </a:xfrm>
           <a:prstGeom prst="rect">
             <a:avLst/>
@@ -13195,7 +13195,7 @@
         <p:spPr>
           <a:xfrm>
             <a:off x="8695080" y="6431400"/>
-            <a:ext cx="484920" cy="426600"/>
+            <a:ext cx="484560" cy="426240"/>
           </a:xfrm>
           <a:prstGeom prst="rect">
             <a:avLst/>
@@ -13221,7 +13221,7 @@
                 <a:spcPct val="100000"/>
               </a:lnSpc>
             </a:pPr>
-            <a:fld id="{D64BDFD7-AF6E-4423-AC1A-8676D16A36B6}" type="slidenum">
+            <a:fld id="{C45EB252-444C-4E3F-9AAD-DB9C58DA1B23}" type="slidenum">
               <a:rPr b="0" lang="fr-FR" sz="2400" spc="-1" strike="noStrike">
                 <a:solidFill>
                   <a:srgbClr val="000000"/>
@@ -13253,7 +13253,7 @@
         <p:txBody>
           <a:bodyPr/>
           <a:p>
-            <a:fld id="{C9530C01-9A9D-4A95-8FCB-E7657358A424}" type="slidenum">
+            <a:fld id="{A45238AA-261C-42FF-B9B1-385B0521984B}" type="slidenum">
               <a:t>39</a:t>
             </a:fld>
           </a:p>
@@ -13302,7 +13302,7 @@
         <p:spPr>
           <a:xfrm>
             <a:off x="1008000" y="260280"/>
-            <a:ext cx="7845480" cy="357120"/>
+            <a:ext cx="7845120" cy="356760"/>
           </a:xfrm>
           <a:prstGeom prst="rect">
             <a:avLst/>
@@ -13358,7 +13358,7 @@
         <p:spPr>
           <a:xfrm>
             <a:off x="1620000" y="900000"/>
-            <a:ext cx="5037120" cy="5037120"/>
+            <a:ext cx="5036760" cy="5036760"/>
           </a:xfrm>
           <a:prstGeom prst="rect">
             <a:avLst/>
@@ -13377,7 +13377,7 @@
         <p:spPr>
           <a:xfrm>
             <a:off x="8820360" y="6431040"/>
-            <a:ext cx="378360" cy="426600"/>
+            <a:ext cx="378000" cy="426240"/>
           </a:xfrm>
           <a:prstGeom prst="rect">
             <a:avLst/>
@@ -13403,7 +13403,7 @@
                 <a:spcPct val="100000"/>
               </a:lnSpc>
             </a:pPr>
-            <a:fld id="{CB4DA3BC-D6F6-4166-981A-06BD2F4DAE12}" type="slidenum">
+            <a:fld id="{BD279C58-C04F-4259-B33F-7C2280E37416}" type="slidenum">
               <a:rPr b="0" lang="fr-FR" sz="2400" spc="-1" strike="noStrike">
                 <a:solidFill>
                   <a:srgbClr val="000000"/>
@@ -13435,7 +13435,7 @@
         <p:txBody>
           <a:bodyPr/>
           <a:p>
-            <a:fld id="{A4F5FAC0-7445-4E2F-8C60-2080E3B6A8F8}" type="slidenum">
+            <a:fld id="{F27EC30F-F9DA-48B3-A17E-D130F0CD9BAD}" type="slidenum">
               <a:t>4</a:t>
             </a:fld>
           </a:p>
@@ -13480,7 +13480,7 @@
         <p:spPr>
           <a:xfrm>
             <a:off x="360000" y="720000"/>
-            <a:ext cx="5759640" cy="539640"/>
+            <a:ext cx="5759280" cy="539280"/>
           </a:xfrm>
           <a:prstGeom prst="rect">
             <a:avLst/>
@@ -13537,7 +13537,7 @@
         <p:spPr>
           <a:xfrm>
             <a:off x="1336680" y="1055160"/>
-            <a:ext cx="6656040" cy="5028840"/>
+            <a:ext cx="6655680" cy="5028480"/>
           </a:xfrm>
           <a:prstGeom prst="rect">
             <a:avLst/>
@@ -13556,7 +13556,7 @@
         <p:spPr>
           <a:xfrm>
             <a:off x="8695080" y="6431400"/>
-            <a:ext cx="484920" cy="426600"/>
+            <a:ext cx="484560" cy="426240"/>
           </a:xfrm>
           <a:prstGeom prst="rect">
             <a:avLst/>
@@ -13582,7 +13582,7 @@
                 <a:spcPct val="100000"/>
               </a:lnSpc>
             </a:pPr>
-            <a:fld id="{BF243985-CC64-4659-8507-1B17039A9DF2}" type="slidenum">
+            <a:fld id="{6D8AB33D-A1AB-4636-93E3-F6FFF734982C}" type="slidenum">
               <a:rPr b="0" lang="fr-FR" sz="2400" spc="-1" strike="noStrike">
                 <a:solidFill>
                   <a:srgbClr val="000000"/>
@@ -13614,7 +13614,7 @@
         <p:txBody>
           <a:bodyPr/>
           <a:p>
-            <a:fld id="{05AF31C3-C805-4C75-B3A9-BA8530E93F30}" type="slidenum">
+            <a:fld id="{1A220C83-CA9F-4336-A5AE-913ED4605F5C}" type="slidenum">
               <a:t>40</a:t>
             </a:fld>
           </a:p>
@@ -13663,7 +13663,7 @@
         <p:spPr>
           <a:xfrm>
             <a:off x="110880" y="1080000"/>
-            <a:ext cx="5828760" cy="1835640"/>
+            <a:ext cx="5828400" cy="1835280"/>
           </a:xfrm>
           <a:prstGeom prst="rect">
             <a:avLst/>
@@ -13681,16 +13681,16 @@
         </p:nvSpPr>
         <p:spPr>
           <a:xfrm flipH="1" rot="16198800">
-            <a:off x="6282000" y="2160360"/>
-            <a:ext cx="918360" cy="557280"/>
+            <a:off x="6282360" y="2160360"/>
+            <a:ext cx="918000" cy="556920"/>
           </a:xfrm>
           <a:custGeom>
             <a:avLst/>
             <a:gdLst>
-              <a:gd name="textAreaLeft" fmla="*/ -360 w 918360"/>
-              <a:gd name="textAreaRight" fmla="*/ 918360 w 918360"/>
-              <a:gd name="textAreaTop" fmla="*/ 0 h 557280"/>
-              <a:gd name="textAreaBottom" fmla="*/ 557640 h 557280"/>
+              <a:gd name="textAreaLeft" fmla="*/ -360 w 918000"/>
+              <a:gd name="textAreaRight" fmla="*/ 918360 w 918000"/>
+              <a:gd name="textAreaTop" fmla="*/ 0 h 556920"/>
+              <a:gd name="textAreaBottom" fmla="*/ 557640 h 556920"/>
             </a:gdLst>
             <a:ahLst/>
             <a:rect l="textAreaLeft" t="textAreaTop" r="textAreaRight" b="textAreaBottom"/>
@@ -13773,7 +13773,7 @@
         <p:spPr>
           <a:xfrm>
             <a:off x="5400000" y="3060000"/>
-            <a:ext cx="3419640" cy="719640"/>
+            <a:ext cx="3419280" cy="719280"/>
           </a:xfrm>
           <a:prstGeom prst="rect">
             <a:avLst/>
@@ -13838,7 +13838,7 @@
         <p:spPr>
           <a:xfrm>
             <a:off x="180000" y="720000"/>
-            <a:ext cx="3959640" cy="345960"/>
+            <a:ext cx="3959280" cy="345600"/>
           </a:xfrm>
           <a:prstGeom prst="rect">
             <a:avLst/>
@@ -13890,16 +13890,16 @@
         </p:nvSpPr>
         <p:spPr>
           <a:xfrm flipH="1" rot="21576600">
-            <a:off x="6259680" y="3961800"/>
-            <a:ext cx="741960" cy="744120"/>
+            <a:off x="6259320" y="3961440"/>
+            <a:ext cx="741600" cy="743760"/>
           </a:xfrm>
           <a:custGeom>
             <a:avLst/>
             <a:gdLst>
-              <a:gd name="textAreaLeft" fmla="*/ -360 w 741960"/>
-              <a:gd name="textAreaRight" fmla="*/ 741960 w 741960"/>
-              <a:gd name="textAreaTop" fmla="*/ 0 h 744120"/>
-              <a:gd name="textAreaBottom" fmla="*/ 744480 h 744120"/>
+              <a:gd name="textAreaLeft" fmla="*/ -360 w 741600"/>
+              <a:gd name="textAreaRight" fmla="*/ 741960 w 741600"/>
+              <a:gd name="textAreaTop" fmla="*/ 0 h 743760"/>
+              <a:gd name="textAreaBottom" fmla="*/ 744480 h 743760"/>
             </a:gdLst>
             <a:ahLst/>
             <a:rect l="textAreaLeft" t="textAreaTop" r="textAreaRight" b="textAreaBottom"/>
@@ -13986,7 +13986,7 @@
         <p:spPr>
           <a:xfrm>
             <a:off x="339120" y="4895640"/>
-            <a:ext cx="8279280" cy="782280"/>
+            <a:ext cx="8278920" cy="781920"/>
           </a:xfrm>
           <a:prstGeom prst="rect">
             <a:avLst/>
@@ -14005,7 +14005,7 @@
         <p:spPr>
           <a:xfrm>
             <a:off x="360000" y="4320000"/>
-            <a:ext cx="4139640" cy="504000"/>
+            <a:ext cx="4139280" cy="503640"/>
           </a:xfrm>
           <a:prstGeom prst="rect">
             <a:avLst/>
@@ -14058,7 +14058,7 @@
         <p:spPr>
           <a:xfrm>
             <a:off x="8695080" y="6431400"/>
-            <a:ext cx="484920" cy="426600"/>
+            <a:ext cx="484560" cy="426240"/>
           </a:xfrm>
           <a:prstGeom prst="rect">
             <a:avLst/>
@@ -14084,7 +14084,7 @@
                 <a:spcPct val="100000"/>
               </a:lnSpc>
             </a:pPr>
-            <a:fld id="{7C66504B-FBC4-4FC6-BAD4-05CF5CA76DD1}" type="slidenum">
+            <a:fld id="{612E64E8-1FD8-47F6-86C6-44B03EF38050}" type="slidenum">
               <a:rPr b="0" lang="fr-FR" sz="2400" spc="-1" strike="noStrike">
                 <a:solidFill>
                   <a:srgbClr val="000000"/>
@@ -14116,7 +14116,7 @@
         <p:txBody>
           <a:bodyPr/>
           <a:p>
-            <a:fld id="{9F65D528-3BEA-4948-A250-7CFA3313DC7A}" type="slidenum">
+            <a:fld id="{F1FFADE4-2BAD-4225-82DD-7441FB69DB39}" type="slidenum">
               <a:t>41</a:t>
             </a:fld>
           </a:p>
@@ -14161,7 +14161,7 @@
         <p:spPr>
           <a:xfrm>
             <a:off x="0" y="720000"/>
-            <a:ext cx="1979640" cy="359640"/>
+            <a:ext cx="1979280" cy="359280"/>
           </a:xfrm>
           <a:prstGeom prst="rect">
             <a:avLst/>
@@ -14214,7 +14214,7 @@
         <p:spPr>
           <a:xfrm>
             <a:off x="487080" y="2713680"/>
-            <a:ext cx="3059640" cy="857880"/>
+            <a:ext cx="3059280" cy="857520"/>
           </a:xfrm>
           <a:prstGeom prst="rect">
             <a:avLst/>
@@ -14267,7 +14267,7 @@
         <p:spPr>
           <a:xfrm>
             <a:off x="4807080" y="2755440"/>
-            <a:ext cx="2699640" cy="857880"/>
+            <a:ext cx="2699280" cy="857520"/>
           </a:xfrm>
           <a:prstGeom prst="rect">
             <a:avLst/>
@@ -14300,7 +14300,7 @@
                 </a:solidFill>
                 <a:latin typeface="Arial"/>
               </a:rPr>
-              <a:t>Similarité Cosine = Produit Scalaire + L2</a:t>
+              <a:t>Similarité Cosine = Produit Scalaire &amp; L2</a:t>
             </a:r>
             <a:endParaRPr b="0" lang="fr-FR" sz="1800" spc="-1" strike="noStrike">
               <a:solidFill>
@@ -14337,7 +14337,7 @@
         <p:spPr>
           <a:xfrm>
             <a:off x="799920" y="1653120"/>
-            <a:ext cx="7479720" cy="880200"/>
+            <a:ext cx="7479360" cy="879840"/>
           </a:xfrm>
           <a:prstGeom prst="rect">
             <a:avLst/>
@@ -14356,7 +14356,7 @@
         <p:spPr>
           <a:xfrm>
             <a:off x="1440000" y="3627720"/>
-            <a:ext cx="6137640" cy="692280"/>
+            <a:ext cx="6137280" cy="691920"/>
           </a:xfrm>
           <a:prstGeom prst="rect">
             <a:avLst/>
@@ -14413,7 +14413,7 @@
         <p:spPr>
           <a:xfrm>
             <a:off x="460800" y="4428000"/>
-            <a:ext cx="7459200" cy="252000"/>
+            <a:ext cx="7458840" cy="251640"/>
           </a:xfrm>
           <a:prstGeom prst="rect">
             <a:avLst/>
@@ -14426,120 +14426,13 @@
       <p:sp>
         <p:nvSpPr>
           <p:cNvPr id="242" name=""/>
-          <p:cNvSpPr txBox="1"/>
+          <p:cNvSpPr/>
           <p:nvPr/>
         </p:nvSpPr>
         <p:spPr>
           <a:xfrm>
             <a:off x="1440000" y="4860000"/>
-            <a:ext cx="1080000" cy="346320"/>
-          </a:xfrm>
-          <a:prstGeom prst="rect">
-            <a:avLst/>
-          </a:prstGeom>
-          <a:noFill/>
-          <a:ln w="0">
-            <a:noFill/>
-          </a:ln>
-        </p:spPr>
-        <p:txBody>
-          <a:bodyPr lIns="90000" rIns="90000" tIns="45000" bIns="45000" anchor="t">
-            <a:noAutofit/>
-          </a:bodyPr>
-          <a:p>
-            <a:r>
-              <a:rPr b="0" lang="fr-FR" sz="1800" spc="-1" strike="noStrike">
-                <a:solidFill>
-                  <a:srgbClr val="000000"/>
-                </a:solidFill>
-                <a:latin typeface="Arial"/>
-              </a:rPr>
-              <a:t>Par ça :</a:t>
-            </a:r>
-            <a:endParaRPr b="0" lang="fr-FR" sz="1800" spc="-1" strike="noStrike">
-              <a:solidFill>
-                <a:srgbClr val="000000"/>
-              </a:solidFill>
-              <a:latin typeface="Arial"/>
-            </a:endParaRPr>
-          </a:p>
-        </p:txBody>
-      </p:sp>
-      <p:pic>
-        <p:nvPicPr>
-          <p:cNvPr id="243" name="" descr=""/>
-          <p:cNvPicPr/>
-          <p:nvPr/>
-        </p:nvPicPr>
-        <p:blipFill>
-          <a:blip r:embed="rId3"/>
-          <a:stretch/>
-        </p:blipFill>
-        <p:spPr>
-          <a:xfrm>
-            <a:off x="1800000" y="5220000"/>
-            <a:ext cx="4957200" cy="360000"/>
-          </a:xfrm>
-          <a:prstGeom prst="rect">
-            <a:avLst/>
-          </a:prstGeom>
-          <a:ln w="0">
-            <a:noFill/>
-          </a:ln>
-        </p:spPr>
-      </p:pic>
-      <p:sp>
-        <p:nvSpPr>
-          <p:cNvPr id="244" name=""/>
-          <p:cNvSpPr txBox="1"/>
-          <p:nvPr/>
-        </p:nvSpPr>
-        <p:spPr>
-          <a:xfrm>
-            <a:off x="756000" y="5760000"/>
-            <a:ext cx="7200000" cy="360000"/>
-          </a:xfrm>
-          <a:prstGeom prst="rect">
-            <a:avLst/>
-          </a:prstGeom>
-          <a:noFill/>
-          <a:ln w="0">
-            <a:noFill/>
-          </a:ln>
-        </p:spPr>
-        <p:txBody>
-          <a:bodyPr lIns="90000" rIns="90000" tIns="45000" bIns="45000" anchor="t">
-            <a:noAutofit/>
-          </a:bodyPr>
-          <a:p>
-            <a:r>
-              <a:rPr b="0" lang="fr-FR" sz="1800" spc="-1" strike="noStrike">
-                <a:solidFill>
-                  <a:srgbClr val="000000"/>
-                </a:solidFill>
-                <a:latin typeface="Arial"/>
-              </a:rPr>
-              <a:t>C’est toujours une similarité cosinus mais sans le principe de norme</a:t>
-            </a:r>
-            <a:endParaRPr b="0" lang="fr-FR" sz="1800" spc="-1" strike="noStrike">
-              <a:solidFill>
-                <a:srgbClr val="000000"/>
-              </a:solidFill>
-              <a:latin typeface="Arial"/>
-            </a:endParaRPr>
-          </a:p>
-        </p:txBody>
-      </p:sp>
-      <p:sp>
-        <p:nvSpPr>
-          <p:cNvPr id="245" name=""/>
-          <p:cNvSpPr/>
-          <p:nvPr/>
-        </p:nvSpPr>
-        <p:spPr>
-          <a:xfrm>
-            <a:off x="8695080" y="6431400"/>
-            <a:ext cx="484920" cy="426600"/>
+            <a:ext cx="1079640" cy="345960"/>
           </a:xfrm>
           <a:prstGeom prst="rect">
             <a:avLst/>
@@ -14565,7 +14458,136 @@
                 <a:spcPct val="100000"/>
               </a:lnSpc>
             </a:pPr>
-            <a:fld id="{7F4C7C4B-C081-47AF-ACF5-A09EB313C25F}" type="slidenum">
+            <a:r>
+              <a:rPr b="0" lang="fr-FR" sz="1800" spc="-1" strike="noStrike">
+                <a:solidFill>
+                  <a:srgbClr val="000000"/>
+                </a:solidFill>
+                <a:latin typeface="Arial"/>
+              </a:rPr>
+              <a:t>Par ça :</a:t>
+            </a:r>
+            <a:endParaRPr b="0" lang="fr-FR" sz="1800" spc="-1" strike="noStrike">
+              <a:solidFill>
+                <a:srgbClr val="000000"/>
+              </a:solidFill>
+              <a:latin typeface="Arial"/>
+            </a:endParaRPr>
+          </a:p>
+        </p:txBody>
+      </p:sp>
+      <p:pic>
+        <p:nvPicPr>
+          <p:cNvPr id="243" name="" descr=""/>
+          <p:cNvPicPr/>
+          <p:nvPr/>
+        </p:nvPicPr>
+        <p:blipFill>
+          <a:blip r:embed="rId3"/>
+          <a:stretch/>
+        </p:blipFill>
+        <p:spPr>
+          <a:xfrm>
+            <a:off x="1800000" y="5220000"/>
+            <a:ext cx="4956840" cy="359640"/>
+          </a:xfrm>
+          <a:prstGeom prst="rect">
+            <a:avLst/>
+          </a:prstGeom>
+          <a:ln w="0">
+            <a:noFill/>
+          </a:ln>
+        </p:spPr>
+      </p:pic>
+      <p:sp>
+        <p:nvSpPr>
+          <p:cNvPr id="244" name=""/>
+          <p:cNvSpPr/>
+          <p:nvPr/>
+        </p:nvSpPr>
+        <p:spPr>
+          <a:xfrm>
+            <a:off x="756000" y="5760000"/>
+            <a:ext cx="7199640" cy="359640"/>
+          </a:xfrm>
+          <a:prstGeom prst="rect">
+            <a:avLst/>
+          </a:prstGeom>
+          <a:noFill/>
+          <a:ln w="0">
+            <a:noFill/>
+          </a:ln>
+        </p:spPr>
+        <p:style>
+          <a:lnRef idx="0"/>
+          <a:fillRef idx="0"/>
+          <a:effectRef idx="0"/>
+          <a:fontRef idx="minor"/>
+        </p:style>
+        <p:txBody>
+          <a:bodyPr lIns="90000" rIns="90000" tIns="45000" bIns="45000" anchor="t">
+            <a:noAutofit/>
+          </a:bodyPr>
+          <a:p>
+            <a:pPr>
+              <a:lnSpc>
+                <a:spcPct val="100000"/>
+              </a:lnSpc>
+            </a:pPr>
+            <a:r>
+              <a:rPr b="0" lang="fr-FR" sz="1800" spc="-1" strike="noStrike">
+                <a:solidFill>
+                  <a:srgbClr val="000000"/>
+                </a:solidFill>
+                <a:latin typeface="Arial"/>
+              </a:rPr>
+              <a:t>C’est toujours une similarité cosinus mais sans le principe de norme</a:t>
+            </a:r>
+            <a:endParaRPr b="0" lang="fr-FR" sz="1800" spc="-1" strike="noStrike">
+              <a:solidFill>
+                <a:srgbClr val="000000"/>
+              </a:solidFill>
+              <a:latin typeface="Arial"/>
+            </a:endParaRPr>
+          </a:p>
+        </p:txBody>
+      </p:sp>
+      <p:sp>
+        <p:nvSpPr>
+          <p:cNvPr id="245" name=""/>
+          <p:cNvSpPr/>
+          <p:nvPr/>
+        </p:nvSpPr>
+        <p:spPr>
+          <a:xfrm>
+            <a:off x="8695080" y="6431400"/>
+            <a:ext cx="484560" cy="426240"/>
+          </a:xfrm>
+          <a:prstGeom prst="rect">
+            <a:avLst/>
+          </a:prstGeom>
+          <a:noFill/>
+          <a:ln w="0">
+            <a:noFill/>
+          </a:ln>
+        </p:spPr>
+        <p:style>
+          <a:lnRef idx="0"/>
+          <a:fillRef idx="0"/>
+          <a:effectRef idx="0"/>
+          <a:fontRef idx="minor"/>
+        </p:style>
+        <p:txBody>
+          <a:bodyPr lIns="90000" rIns="90000" tIns="45000" bIns="45000" anchor="t">
+            <a:noAutofit/>
+          </a:bodyPr>
+          <a:p>
+            <a:pPr>
+              <a:lnSpc>
+                <a:spcPct val="100000"/>
+              </a:lnSpc>
+            </a:pPr>
+            <a:fld id="{8C7CEBBD-48C3-4563-95AF-71D013666B6F}" type="slidenum">
               <a:rPr b="0" lang="fr-FR" sz="2400" spc="-1" strike="noStrike">
                 <a:solidFill>
                   <a:srgbClr val="000000"/>
@@ -14597,7 +14619,7 @@
         <p:txBody>
           <a:bodyPr/>
           <a:p>
-            <a:fld id="{5D451D2F-9E53-4CAB-AF19-B18DA952397D}" type="slidenum">
+            <a:fld id="{5FAF1842-E575-4EE3-B464-670461612E14}" type="slidenum">
               <a:t>42</a:t>
             </a:fld>
           </a:p>
@@ -14642,7 +14664,7 @@
         <p:spPr>
           <a:xfrm>
             <a:off x="0" y="720000"/>
-            <a:ext cx="1799640" cy="359640"/>
+            <a:ext cx="1799280" cy="359280"/>
           </a:xfrm>
           <a:prstGeom prst="rect">
             <a:avLst/>
@@ -14699,7 +14721,7 @@
         <p:spPr>
           <a:xfrm>
             <a:off x="88200" y="1509480"/>
-            <a:ext cx="4231440" cy="1370160"/>
+            <a:ext cx="4231080" cy="1369800"/>
           </a:xfrm>
           <a:prstGeom prst="rect">
             <a:avLst/>
@@ -14722,7 +14744,7 @@
         <p:spPr>
           <a:xfrm>
             <a:off x="4500000" y="180000"/>
-            <a:ext cx="4139640" cy="3335760"/>
+            <a:ext cx="4139280" cy="3335400"/>
           </a:xfrm>
           <a:prstGeom prst="rect">
             <a:avLst/>
@@ -14745,7 +14767,7 @@
         <p:spPr>
           <a:xfrm>
             <a:off x="360000" y="3600000"/>
-            <a:ext cx="6743520" cy="2361600"/>
+            <a:ext cx="6743160" cy="2361240"/>
           </a:xfrm>
           <a:prstGeom prst="rect">
             <a:avLst/>
@@ -14764,7 +14786,7 @@
         <p:spPr>
           <a:xfrm>
             <a:off x="8695080" y="6431400"/>
-            <a:ext cx="484920" cy="426600"/>
+            <a:ext cx="484560" cy="426240"/>
           </a:xfrm>
           <a:prstGeom prst="rect">
             <a:avLst/>
@@ -14790,7 +14812,7 @@
                 <a:spcPct val="100000"/>
               </a:lnSpc>
             </a:pPr>
-            <a:fld id="{7B4EC6C6-872F-44CA-9301-5AFEA6D14CE6}" type="slidenum">
+            <a:fld id="{411E3914-4F6B-402E-ACEB-9709F4CC79E0}" type="slidenum">
               <a:rPr b="0" lang="fr-FR" sz="2400" spc="-1" strike="noStrike">
                 <a:solidFill>
                   <a:srgbClr val="000000"/>
@@ -14822,7 +14844,7 @@
         <p:txBody>
           <a:bodyPr/>
           <a:p>
-            <a:fld id="{189478D3-CB7E-47C5-9C6D-D84FF03A8346}" type="slidenum">
+            <a:fld id="{B79A4518-9358-4392-B0D6-0984864129BD}" type="slidenum">
               <a:t>43</a:t>
             </a:fld>
           </a:p>
@@ -14867,7 +14889,7 @@
         <p:spPr>
           <a:xfrm>
             <a:off x="0" y="720000"/>
-            <a:ext cx="1979640" cy="719640"/>
+            <a:ext cx="1979280" cy="719280"/>
           </a:xfrm>
           <a:prstGeom prst="rect">
             <a:avLst/>
@@ -14924,7 +14946,7 @@
         <p:spPr>
           <a:xfrm>
             <a:off x="1800000" y="900000"/>
-            <a:ext cx="5597640" cy="1280160"/>
+            <a:ext cx="5597280" cy="1279800"/>
           </a:xfrm>
           <a:prstGeom prst="rect">
             <a:avLst/>
@@ -14947,7 +14969,7 @@
         <p:spPr>
           <a:xfrm>
             <a:off x="1787040" y="2520000"/>
-            <a:ext cx="5520600" cy="3239640"/>
+            <a:ext cx="5520240" cy="3239280"/>
           </a:xfrm>
           <a:prstGeom prst="rect">
             <a:avLst/>
@@ -14966,7 +14988,7 @@
         <p:spPr>
           <a:xfrm>
             <a:off x="8695080" y="6431400"/>
-            <a:ext cx="484920" cy="426600"/>
+            <a:ext cx="484560" cy="426240"/>
           </a:xfrm>
           <a:prstGeom prst="rect">
             <a:avLst/>
@@ -14992,7 +15014,7 @@
                 <a:spcPct val="100000"/>
               </a:lnSpc>
             </a:pPr>
-            <a:fld id="{7305BFAE-C901-4C60-BFF9-6C0774805694}" type="slidenum">
+            <a:fld id="{DDB6C5AD-6C5D-47B4-B260-8092671D7C0D}" type="slidenum">
               <a:rPr b="0" lang="fr-FR" sz="2400" spc="-1" strike="noStrike">
                 <a:solidFill>
                   <a:srgbClr val="000000"/>
@@ -15024,7 +15046,7 @@
         <p:txBody>
           <a:bodyPr/>
           <a:p>
-            <a:fld id="{85AC1531-8546-4EA0-AF50-A886A6AE7874}" type="slidenum">
+            <a:fld id="{8158F78D-DAC4-41A3-90B5-00196183742E}" type="slidenum">
               <a:t>44</a:t>
             </a:fld>
           </a:p>
@@ -15069,7 +15091,7 @@
         <p:spPr>
           <a:xfrm>
             <a:off x="180000" y="720000"/>
-            <a:ext cx="3239640" cy="359640"/>
+            <a:ext cx="3239280" cy="359280"/>
           </a:xfrm>
           <a:prstGeom prst="rect">
             <a:avLst/>
@@ -15122,7 +15144,7 @@
         <p:spPr>
           <a:xfrm>
             <a:off x="2340000" y="1080000"/>
-            <a:ext cx="3239640" cy="539640"/>
+            <a:ext cx="3239280" cy="539280"/>
           </a:xfrm>
           <a:prstGeom prst="rect">
             <a:avLst/>
@@ -15175,7 +15197,7 @@
         <p:spPr>
           <a:xfrm>
             <a:off x="3600000" y="1620000"/>
-            <a:ext cx="539640" cy="899640"/>
+            <a:ext cx="539280" cy="899280"/>
           </a:xfrm>
           <a:prstGeom prst="downArrow">
             <a:avLst>
@@ -15226,7 +15248,7 @@
         <p:spPr>
           <a:xfrm>
             <a:off x="900000" y="2340000"/>
-            <a:ext cx="5759640" cy="1113840"/>
+            <a:ext cx="5759280" cy="1113480"/>
           </a:xfrm>
           <a:prstGeom prst="rect">
             <a:avLst/>
@@ -15313,7 +15335,7 @@
         <p:spPr>
           <a:xfrm>
             <a:off x="3600000" y="3240000"/>
-            <a:ext cx="539640" cy="899640"/>
+            <a:ext cx="539280" cy="899280"/>
           </a:xfrm>
           <a:prstGeom prst="downArrow">
             <a:avLst>
@@ -15364,7 +15386,7 @@
         <p:spPr>
           <a:xfrm>
             <a:off x="1080000" y="4320000"/>
-            <a:ext cx="6119640" cy="1369800"/>
+            <a:ext cx="6119280" cy="1369440"/>
           </a:xfrm>
           <a:prstGeom prst="rect">
             <a:avLst/>
@@ -15467,169 +15489,13 @@
       <p:sp>
         <p:nvSpPr>
           <p:cNvPr id="261" name=""/>
-          <p:cNvSpPr txBox="1"/>
+          <p:cNvSpPr/>
           <p:nvPr/>
         </p:nvSpPr>
         <p:spPr>
           <a:xfrm>
             <a:off x="6120000" y="1850040"/>
-            <a:ext cx="2880000" cy="2649960"/>
-          </a:xfrm>
-          <a:prstGeom prst="rect">
-            <a:avLst/>
-          </a:prstGeom>
-          <a:noFill/>
-          <a:ln w="0">
-            <a:noFill/>
-          </a:ln>
-        </p:spPr>
-        <p:txBody>
-          <a:bodyPr lIns="90000" rIns="90000" tIns="45000" bIns="45000" anchor="t">
-            <a:noAutofit/>
-          </a:bodyPr>
-          <a:p>
-            <a:r>
-              <a:rPr b="0" lang="fr-FR" sz="1800" spc="-1" strike="noStrike">
-                <a:solidFill>
-                  <a:srgbClr val="000000"/>
-                </a:solidFill>
-                <a:latin typeface="Arial"/>
-              </a:rPr>
-              <a:t>Word2Vec: </a:t>
-            </a:r>
-            <a:br>
-              <a:rPr sz="1800"/>
-            </a:br>
-            <a:r>
-              <a:rPr b="0" lang="fr-FR" sz="1800" spc="-1" strike="noStrike">
-                <a:solidFill>
-                  <a:srgbClr val="000000"/>
-                </a:solidFill>
-                <a:latin typeface="Arial"/>
-              </a:rPr>
-              <a:t>On itère sur:</a:t>
-            </a:r>
-            <a:endParaRPr b="0" lang="fr-FR" sz="1800" spc="-1" strike="noStrike">
-              <a:solidFill>
-                <a:srgbClr val="000000"/>
-              </a:solidFill>
-              <a:latin typeface="Arial"/>
-            </a:endParaRPr>
-          </a:p>
-          <a:p>
-            <a:r>
-              <a:rPr b="0" lang="fr-FR" sz="1800" spc="-1" strike="noStrike">
-                <a:solidFill>
-                  <a:srgbClr val="000000"/>
-                </a:solidFill>
-                <a:latin typeface="Arial"/>
-              </a:rPr>
-              <a:t>-Prendre un contexte</a:t>
-            </a:r>
-            <a:endParaRPr b="0" lang="fr-FR" sz="1800" spc="-1" strike="noStrike">
-              <a:solidFill>
-                <a:srgbClr val="000000"/>
-              </a:solidFill>
-              <a:latin typeface="Arial"/>
-            </a:endParaRPr>
-          </a:p>
-          <a:p>
-            <a:r>
-              <a:rPr b="0" lang="fr-FR" sz="1800" spc="-1" strike="noStrike">
-                <a:solidFill>
-                  <a:srgbClr val="000000"/>
-                </a:solidFill>
-                <a:latin typeface="Arial"/>
-              </a:rPr>
-              <a:t>-Prédire un mot central</a:t>
-            </a:r>
-            <a:endParaRPr b="0" lang="fr-FR" sz="1800" spc="-1" strike="noStrike">
-              <a:solidFill>
-                <a:srgbClr val="000000"/>
-              </a:solidFill>
-              <a:latin typeface="Arial"/>
-            </a:endParaRPr>
-          </a:p>
-          <a:p>
-            <a:r>
-              <a:rPr b="0" lang="fr-FR" sz="1800" spc="-1" strike="noStrike">
-                <a:solidFill>
-                  <a:srgbClr val="000000"/>
-                </a:solidFill>
-                <a:latin typeface="Arial"/>
-              </a:rPr>
-              <a:t>-Comparer</a:t>
-            </a:r>
-            <a:endParaRPr b="0" lang="fr-FR" sz="1800" spc="-1" strike="noStrike">
-              <a:solidFill>
-                <a:srgbClr val="000000"/>
-              </a:solidFill>
-              <a:latin typeface="Arial"/>
-            </a:endParaRPr>
-          </a:p>
-          <a:p>
-            <a:r>
-              <a:rPr b="0" lang="fr-FR" sz="1800" spc="-1" strike="noStrike">
-                <a:solidFill>
-                  <a:srgbClr val="000000"/>
-                </a:solidFill>
-                <a:latin typeface="Arial"/>
-              </a:rPr>
-              <a:t>-Ajuster les poids</a:t>
-            </a:r>
-            <a:endParaRPr b="0" lang="fr-FR" sz="1800" spc="-1" strike="noStrike">
-              <a:solidFill>
-                <a:srgbClr val="000000"/>
-              </a:solidFill>
-              <a:latin typeface="Arial"/>
-            </a:endParaRPr>
-          </a:p>
-          <a:p>
-            <a:r>
-              <a:rPr b="0" lang="fr-FR" sz="1800" spc="-1" strike="noStrike">
-                <a:solidFill>
-                  <a:srgbClr val="000000"/>
-                </a:solidFill>
-                <a:latin typeface="Arial"/>
-              </a:rPr>
-              <a:t>=CBOW</a:t>
-            </a:r>
-            <a:endParaRPr b="0" lang="fr-FR" sz="1800" spc="-1" strike="noStrike">
-              <a:solidFill>
-                <a:srgbClr val="000000"/>
-              </a:solidFill>
-              <a:latin typeface="Arial"/>
-            </a:endParaRPr>
-          </a:p>
-          <a:p>
-            <a:r>
-              <a:rPr b="0" lang="fr-FR" sz="1800" spc="-1" strike="noStrike">
-                <a:solidFill>
-                  <a:srgbClr val="000000"/>
-                </a:solidFill>
-                <a:latin typeface="Arial"/>
-              </a:rPr>
-              <a:t>Ou on inverse contexte et mot central = Skip-Gram</a:t>
-            </a:r>
-            <a:endParaRPr b="0" lang="fr-FR" sz="1800" spc="-1" strike="noStrike">
-              <a:solidFill>
-                <a:srgbClr val="000000"/>
-              </a:solidFill>
-              <a:latin typeface="Arial"/>
-            </a:endParaRPr>
-          </a:p>
-        </p:txBody>
-      </p:sp>
-      <p:sp>
-        <p:nvSpPr>
-          <p:cNvPr id="262" name=""/>
-          <p:cNvSpPr/>
-          <p:nvPr/>
-        </p:nvSpPr>
-        <p:spPr>
-          <a:xfrm>
-            <a:off x="8695080" y="6431400"/>
-            <a:ext cx="484920" cy="426600"/>
+            <a:ext cx="2879640" cy="2649600"/>
           </a:xfrm>
           <a:prstGeom prst="rect">
             <a:avLst/>
@@ -15655,48 +15521,185 @@
                 <a:spcPct val="100000"/>
               </a:lnSpc>
             </a:pPr>
-            <a:fld id="{D0CCEF46-D465-4745-9BBA-31DE26303721}" type="slidenum">
-              <a:rPr b="0" lang="fr-FR" sz="2400" spc="-1" strike="noStrike">
-                <a:solidFill>
-                  <a:srgbClr val="000000"/>
-                </a:solidFill>
-                <a:latin typeface="Times New Roman"/>
-              </a:rPr>
-              <a:t>&lt;numéro&gt;</a:t>
-            </a:fld>
-            <a:endParaRPr b="0" lang="fr-FR" sz="2400" spc="-1" strike="noStrike">
-              <a:solidFill>
-                <a:srgbClr val="000000"/>
-              </a:solidFill>
-              <a:latin typeface="Arial"/>
-            </a:endParaRPr>
-          </a:p>
-        </p:txBody>
-      </p:sp>
-      <p:sp>
-        <p:nvSpPr>
-          <p:cNvPr id="263" name=""/>
+            <a:r>
+              <a:rPr b="0" lang="fr-FR" sz="1800" spc="-1" strike="noStrike">
+                <a:solidFill>
+                  <a:srgbClr val="000000"/>
+                </a:solidFill>
+                <a:latin typeface="Arial"/>
+              </a:rPr>
+              <a:t>Word2Vec: </a:t>
+            </a:r>
+            <a:br>
+              <a:rPr sz="1800"/>
+            </a:br>
+            <a:r>
+              <a:rPr b="0" lang="fr-FR" sz="1800" spc="-1" strike="noStrike">
+                <a:solidFill>
+                  <a:srgbClr val="000000"/>
+                </a:solidFill>
+                <a:latin typeface="Arial"/>
+              </a:rPr>
+              <a:t>On itère sur:</a:t>
+            </a:r>
+            <a:endParaRPr b="0" lang="fr-FR" sz="1800" spc="-1" strike="noStrike">
+              <a:solidFill>
+                <a:srgbClr val="000000"/>
+              </a:solidFill>
+              <a:latin typeface="Arial"/>
+            </a:endParaRPr>
+          </a:p>
+          <a:p>
+            <a:pPr>
+              <a:lnSpc>
+                <a:spcPct val="100000"/>
+              </a:lnSpc>
+            </a:pPr>
+            <a:r>
+              <a:rPr b="0" lang="fr-FR" sz="1800" spc="-1" strike="noStrike">
+                <a:solidFill>
+                  <a:srgbClr val="000000"/>
+                </a:solidFill>
+                <a:latin typeface="Arial"/>
+              </a:rPr>
+              <a:t>-Prendre un contexte</a:t>
+            </a:r>
+            <a:endParaRPr b="0" lang="fr-FR" sz="1800" spc="-1" strike="noStrike">
+              <a:solidFill>
+                <a:srgbClr val="000000"/>
+              </a:solidFill>
+              <a:latin typeface="Arial"/>
+            </a:endParaRPr>
+          </a:p>
+          <a:p>
+            <a:pPr>
+              <a:lnSpc>
+                <a:spcPct val="100000"/>
+              </a:lnSpc>
+            </a:pPr>
+            <a:r>
+              <a:rPr b="0" lang="fr-FR" sz="1800" spc="-1" strike="noStrike">
+                <a:solidFill>
+                  <a:srgbClr val="000000"/>
+                </a:solidFill>
+                <a:latin typeface="Arial"/>
+              </a:rPr>
+              <a:t>-Prédire un mot central</a:t>
+            </a:r>
+            <a:endParaRPr b="0" lang="fr-FR" sz="1800" spc="-1" strike="noStrike">
+              <a:solidFill>
+                <a:srgbClr val="000000"/>
+              </a:solidFill>
+              <a:latin typeface="Arial"/>
+            </a:endParaRPr>
+          </a:p>
+          <a:p>
+            <a:pPr>
+              <a:lnSpc>
+                <a:spcPct val="100000"/>
+              </a:lnSpc>
+            </a:pPr>
+            <a:r>
+              <a:rPr b="0" lang="fr-FR" sz="1800" spc="-1" strike="noStrike">
+                <a:solidFill>
+                  <a:srgbClr val="000000"/>
+                </a:solidFill>
+                <a:latin typeface="Arial"/>
+              </a:rPr>
+              <a:t>-Comparer</a:t>
+            </a:r>
+            <a:endParaRPr b="0" lang="fr-FR" sz="1800" spc="-1" strike="noStrike">
+              <a:solidFill>
+                <a:srgbClr val="000000"/>
+              </a:solidFill>
+              <a:latin typeface="Arial"/>
+            </a:endParaRPr>
+          </a:p>
+          <a:p>
+            <a:pPr>
+              <a:lnSpc>
+                <a:spcPct val="100000"/>
+              </a:lnSpc>
+            </a:pPr>
+            <a:r>
+              <a:rPr b="0" lang="fr-FR" sz="1800" spc="-1" strike="noStrike">
+                <a:solidFill>
+                  <a:srgbClr val="000000"/>
+                </a:solidFill>
+                <a:latin typeface="Arial"/>
+              </a:rPr>
+              <a:t>-Ajuster les poids</a:t>
+            </a:r>
+            <a:endParaRPr b="0" lang="fr-FR" sz="1800" spc="-1" strike="noStrike">
+              <a:solidFill>
+                <a:srgbClr val="000000"/>
+              </a:solidFill>
+              <a:latin typeface="Arial"/>
+            </a:endParaRPr>
+          </a:p>
+          <a:p>
+            <a:pPr>
+              <a:lnSpc>
+                <a:spcPct val="100000"/>
+              </a:lnSpc>
+            </a:pPr>
+            <a:r>
+              <a:rPr b="0" lang="fr-FR" sz="1800" spc="-1" strike="noStrike">
+                <a:solidFill>
+                  <a:srgbClr val="000000"/>
+                </a:solidFill>
+                <a:latin typeface="Arial"/>
+              </a:rPr>
+              <a:t>=CBOW</a:t>
+            </a:r>
+            <a:endParaRPr b="0" lang="fr-FR" sz="1800" spc="-1" strike="noStrike">
+              <a:solidFill>
+                <a:srgbClr val="000000"/>
+              </a:solidFill>
+              <a:latin typeface="Arial"/>
+            </a:endParaRPr>
+          </a:p>
+          <a:p>
+            <a:pPr>
+              <a:lnSpc>
+                <a:spcPct val="100000"/>
+              </a:lnSpc>
+            </a:pPr>
+            <a:r>
+              <a:rPr b="0" lang="fr-FR" sz="1800" spc="-1" strike="noStrike">
+                <a:solidFill>
+                  <a:srgbClr val="000000"/>
+                </a:solidFill>
+                <a:latin typeface="Arial"/>
+              </a:rPr>
+              <a:t>Ou on inverse contexte et mot central = Skip-Gram</a:t>
+            </a:r>
+            <a:endParaRPr b="0" lang="fr-FR" sz="1800" spc="-1" strike="noStrike">
+              <a:solidFill>
+                <a:srgbClr val="000000"/>
+              </a:solidFill>
+              <a:latin typeface="Arial"/>
+            </a:endParaRPr>
+          </a:p>
+        </p:txBody>
+      </p:sp>
+      <p:sp>
+        <p:nvSpPr>
+          <p:cNvPr id="262" name=""/>
           <p:cNvSpPr/>
           <p:nvPr/>
         </p:nvSpPr>
         <p:spPr>
-          <a:xfrm rot="18273000">
-            <a:off x="5323320" y="1467360"/>
-            <a:ext cx="539640" cy="899640"/>
-          </a:xfrm>
-          <a:prstGeom prst="downArrow">
-            <a:avLst>
-              <a:gd name="adj1" fmla="val 50000"/>
-              <a:gd name="adj2" fmla="val 41667"/>
-            </a:avLst>
-          </a:prstGeom>
-          <a:solidFill>
-            <a:srgbClr val="729fcf"/>
-          </a:solidFill>
-          <a:ln w="0">
-            <a:solidFill>
-              <a:srgbClr val="3465a4"/>
-            </a:solidFill>
+          <a:xfrm>
+            <a:off x="8695080" y="6431400"/>
+            <a:ext cx="484560" cy="426240"/>
+          </a:xfrm>
+          <a:prstGeom prst="rect">
+            <a:avLst/>
+          </a:prstGeom>
+          <a:noFill/>
+          <a:ln w="0">
+            <a:noFill/>
           </a:ln>
         </p:spPr>
         <p:style>
@@ -15706,29 +15709,43 @@
           <a:fontRef idx="minor"/>
         </p:style>
         <p:txBody>
-          <a:bodyPr lIns="90000" rIns="90000" tIns="45000" bIns="45000" anchor="ctr">
+          <a:bodyPr lIns="90000" rIns="90000" tIns="45000" bIns="45000" anchor="t">
             <a:noAutofit/>
           </a:bodyPr>
           <a:p>
-            <a:endParaRPr b="0" lang="fr-FR" sz="1800" spc="-1" strike="noStrike">
-              <a:solidFill>
-                <a:srgbClr val="000000"/>
-              </a:solidFill>
-              <a:latin typeface="Arial"/>
-            </a:endParaRPr>
-          </a:p>
-        </p:txBody>
-      </p:sp>
-      <p:sp>
-        <p:nvSpPr>
-          <p:cNvPr id="264" name=""/>
+            <a:pPr>
+              <a:lnSpc>
+                <a:spcPct val="100000"/>
+              </a:lnSpc>
+            </a:pPr>
+            <a:fld id="{AA900152-AE76-4F27-BF5A-0CCBE186B730}" type="slidenum">
+              <a:rPr b="0" lang="fr-FR" sz="2400" spc="-1" strike="noStrike">
+                <a:solidFill>
+                  <a:srgbClr val="000000"/>
+                </a:solidFill>
+                <a:latin typeface="Times New Roman"/>
+              </a:rPr>
+              <a:t>&lt;numéro&gt;</a:t>
+            </a:fld>
+            <a:endParaRPr b="0" lang="fr-FR" sz="2400" spc="-1" strike="noStrike">
+              <a:solidFill>
+                <a:srgbClr val="000000"/>
+              </a:solidFill>
+              <a:latin typeface="Arial"/>
+            </a:endParaRPr>
+          </a:p>
+        </p:txBody>
+      </p:sp>
+      <p:sp>
+        <p:nvSpPr>
+          <p:cNvPr id="263" name=""/>
           <p:cNvSpPr/>
           <p:nvPr/>
         </p:nvSpPr>
         <p:spPr>
-          <a:xfrm rot="2220000">
-            <a:off x="5364000" y="3851640"/>
-            <a:ext cx="539640" cy="899640"/>
+          <a:xfrm rot="18273000">
+            <a:off x="5322960" y="1467360"/>
+            <a:ext cx="539280" cy="899280"/>
           </a:xfrm>
           <a:prstGeom prst="downArrow">
             <a:avLst>
@@ -15756,6 +15773,62 @@
             <a:noAutofit/>
           </a:bodyPr>
           <a:p>
+            <a:pPr>
+              <a:lnSpc>
+                <a:spcPct val="100000"/>
+              </a:lnSpc>
+            </a:pPr>
+            <a:endParaRPr b="0" lang="fr-FR" sz="1800" spc="-1" strike="noStrike">
+              <a:solidFill>
+                <a:srgbClr val="000000"/>
+              </a:solidFill>
+              <a:latin typeface="Arial"/>
+            </a:endParaRPr>
+          </a:p>
+        </p:txBody>
+      </p:sp>
+      <p:sp>
+        <p:nvSpPr>
+          <p:cNvPr id="264" name=""/>
+          <p:cNvSpPr/>
+          <p:nvPr/>
+        </p:nvSpPr>
+        <p:spPr>
+          <a:xfrm rot="2220000">
+            <a:off x="5364000" y="3851640"/>
+            <a:ext cx="539280" cy="899280"/>
+          </a:xfrm>
+          <a:prstGeom prst="downArrow">
+            <a:avLst>
+              <a:gd name="adj1" fmla="val 50000"/>
+              <a:gd name="adj2" fmla="val 41667"/>
+            </a:avLst>
+          </a:prstGeom>
+          <a:solidFill>
+            <a:srgbClr val="729fcf"/>
+          </a:solidFill>
+          <a:ln w="0">
+            <a:solidFill>
+              <a:srgbClr val="3465a4"/>
+            </a:solidFill>
+          </a:ln>
+        </p:spPr>
+        <p:style>
+          <a:lnRef idx="0"/>
+          <a:fillRef idx="0"/>
+          <a:effectRef idx="0"/>
+          <a:fontRef idx="minor"/>
+        </p:style>
+        <p:txBody>
+          <a:bodyPr lIns="90000" rIns="90000" tIns="45000" bIns="45000" anchor="ctr">
+            <a:noAutofit/>
+          </a:bodyPr>
+          <a:p>
+            <a:pPr>
+              <a:lnSpc>
+                <a:spcPct val="100000"/>
+              </a:lnSpc>
+            </a:pPr>
             <a:endParaRPr b="0" lang="fr-FR" sz="1800" spc="-1" strike="noStrike">
               <a:solidFill>
                 <a:srgbClr val="000000"/>
@@ -15779,7 +15852,7 @@
         <p:txBody>
           <a:bodyPr/>
           <a:p>
-            <a:fld id="{FB62C9A9-CC6C-4E30-A3D7-45ACA176E685}" type="slidenum">
+            <a:fld id="{ADF854B0-8C5B-4BDA-BD2A-CD375C347FEC}" type="slidenum">
               <a:t>45</a:t>
             </a:fld>
           </a:p>
@@ -15828,7 +15901,7 @@
         <p:spPr>
           <a:xfrm>
             <a:off x="540000" y="1440000"/>
-            <a:ext cx="7616520" cy="4140000"/>
+            <a:ext cx="7616160" cy="4139640"/>
           </a:xfrm>
           <a:prstGeom prst="rect">
             <a:avLst/>
@@ -15841,55 +15914,13 @@
       <p:sp>
         <p:nvSpPr>
           <p:cNvPr id="266" name=""/>
-          <p:cNvSpPr txBox="1"/>
+          <p:cNvSpPr/>
           <p:nvPr/>
         </p:nvSpPr>
         <p:spPr>
           <a:xfrm>
             <a:off x="180000" y="720000"/>
-            <a:ext cx="1980000" cy="360000"/>
-          </a:xfrm>
-          <a:prstGeom prst="rect">
-            <a:avLst/>
-          </a:prstGeom>
-          <a:noFill/>
-          <a:ln w="0">
-            <a:noFill/>
-          </a:ln>
-        </p:spPr>
-        <p:txBody>
-          <a:bodyPr lIns="90000" rIns="90000" tIns="45000" bIns="45000" anchor="t">
-            <a:noAutofit/>
-          </a:bodyPr>
-          <a:p>
-            <a:r>
-              <a:rPr b="0" lang="fr-FR" sz="1800" spc="-1" strike="noStrike">
-                <a:solidFill>
-                  <a:srgbClr val="000000"/>
-                </a:solidFill>
-                <a:latin typeface="Arial"/>
-              </a:rPr>
-              <a:t>Schéma de l’appli</a:t>
-            </a:r>
-            <a:endParaRPr b="0" lang="fr-FR" sz="1800" spc="-1" strike="noStrike">
-              <a:solidFill>
-                <a:srgbClr val="000000"/>
-              </a:solidFill>
-              <a:latin typeface="Arial"/>
-            </a:endParaRPr>
-          </a:p>
-        </p:txBody>
-      </p:sp>
-      <p:sp>
-        <p:nvSpPr>
-          <p:cNvPr id="267" name=""/>
-          <p:cNvSpPr/>
-          <p:nvPr/>
-        </p:nvSpPr>
-        <p:spPr>
-          <a:xfrm>
-            <a:off x="8695080" y="6431400"/>
-            <a:ext cx="484920" cy="426600"/>
+            <a:ext cx="1979640" cy="359640"/>
           </a:xfrm>
           <a:prstGeom prst="rect">
             <a:avLst/>
@@ -15915,7 +15946,60 @@
                 <a:spcPct val="100000"/>
               </a:lnSpc>
             </a:pPr>
-            <a:fld id="{3CE238A5-97AC-48F5-8B6E-F438892534EF}" type="slidenum">
+            <a:r>
+              <a:rPr b="0" lang="fr-FR" sz="1800" spc="-1" strike="noStrike">
+                <a:solidFill>
+                  <a:srgbClr val="000000"/>
+                </a:solidFill>
+                <a:latin typeface="Arial"/>
+              </a:rPr>
+              <a:t>Schéma de l’appli</a:t>
+            </a:r>
+            <a:endParaRPr b="0" lang="fr-FR" sz="1800" spc="-1" strike="noStrike">
+              <a:solidFill>
+                <a:srgbClr val="000000"/>
+              </a:solidFill>
+              <a:latin typeface="Arial"/>
+            </a:endParaRPr>
+          </a:p>
+        </p:txBody>
+      </p:sp>
+      <p:sp>
+        <p:nvSpPr>
+          <p:cNvPr id="267" name=""/>
+          <p:cNvSpPr/>
+          <p:nvPr/>
+        </p:nvSpPr>
+        <p:spPr>
+          <a:xfrm>
+            <a:off x="8695080" y="6431400"/>
+            <a:ext cx="484560" cy="426240"/>
+          </a:xfrm>
+          <a:prstGeom prst="rect">
+            <a:avLst/>
+          </a:prstGeom>
+          <a:noFill/>
+          <a:ln w="0">
+            <a:noFill/>
+          </a:ln>
+        </p:spPr>
+        <p:style>
+          <a:lnRef idx="0"/>
+          <a:fillRef idx="0"/>
+          <a:effectRef idx="0"/>
+          <a:fontRef idx="minor"/>
+        </p:style>
+        <p:txBody>
+          <a:bodyPr lIns="90000" rIns="90000" tIns="45000" bIns="45000" anchor="t">
+            <a:noAutofit/>
+          </a:bodyPr>
+          <a:p>
+            <a:pPr>
+              <a:lnSpc>
+                <a:spcPct val="100000"/>
+              </a:lnSpc>
+            </a:pPr>
+            <a:fld id="{62E93EAC-8BB3-43A2-A093-FA6975A5B49A}" type="slidenum">
               <a:rPr b="0" lang="fr-FR" sz="2400" spc="-1" strike="noStrike">
                 <a:solidFill>
                   <a:srgbClr val="000000"/>
@@ -15947,7 +16031,7 @@
         <p:txBody>
           <a:bodyPr/>
           <a:p>
-            <a:fld id="{6F117BCD-A3DC-49BE-8257-89A61FC08B5D}" type="slidenum">
+            <a:fld id="{4AB70FD6-40F9-4A50-9D79-C80F19C31088}" type="slidenum">
               <a:t>46</a:t>
             </a:fld>
           </a:p>
@@ -15996,7 +16080,7 @@
         <p:spPr>
           <a:xfrm>
             <a:off x="647640" y="836640"/>
-            <a:ext cx="6009480" cy="960480"/>
+            <a:ext cx="6009120" cy="960120"/>
           </a:xfrm>
           <a:prstGeom prst="rect">
             <a:avLst/>
@@ -16093,7 +16177,7 @@
         <p:spPr>
           <a:xfrm>
             <a:off x="1008000" y="260280"/>
-            <a:ext cx="7845480" cy="357120"/>
+            <a:ext cx="7845120" cy="356760"/>
           </a:xfrm>
           <a:prstGeom prst="rect">
             <a:avLst/>
@@ -16145,7 +16229,7 @@
         <p:spPr>
           <a:xfrm>
             <a:off x="1440000" y="1980000"/>
-            <a:ext cx="6837120" cy="537120"/>
+            <a:ext cx="6836760" cy="536760"/>
           </a:xfrm>
           <a:prstGeom prst="rect">
             <a:avLst/>
@@ -16255,7 +16339,7 @@
         <p:spPr>
           <a:xfrm>
             <a:off x="540000" y="2520000"/>
-            <a:ext cx="3777120" cy="2337120"/>
+            <a:ext cx="3776760" cy="2336760"/>
           </a:xfrm>
           <a:prstGeom prst="rect">
             <a:avLst/>
@@ -16413,7 +16497,7 @@
         <p:spPr>
           <a:xfrm>
             <a:off x="5040000" y="2520000"/>
-            <a:ext cx="3777120" cy="2157120"/>
+            <a:ext cx="3776760" cy="2156760"/>
           </a:xfrm>
           <a:prstGeom prst="rect">
             <a:avLst/>
@@ -16611,7 +16695,7 @@
         <p:spPr>
           <a:xfrm>
             <a:off x="2772000" y="5593320"/>
-            <a:ext cx="3417120" cy="343800"/>
+            <a:ext cx="3416760" cy="343440"/>
           </a:xfrm>
           <a:prstGeom prst="rect">
             <a:avLst/>
@@ -16664,7 +16748,7 @@
         <p:spPr>
           <a:xfrm>
             <a:off x="8820360" y="6431040"/>
-            <a:ext cx="378360" cy="426600"/>
+            <a:ext cx="378000" cy="426240"/>
           </a:xfrm>
           <a:prstGeom prst="rect">
             <a:avLst/>
@@ -16690,7 +16774,7 @@
                 <a:spcPct val="100000"/>
               </a:lnSpc>
             </a:pPr>
-            <a:fld id="{6F4016D4-BB22-4FDD-B25C-D19CA1D24C12}" type="slidenum">
+            <a:fld id="{C848D190-4ECC-48C7-86B4-38B77134B3EB}" type="slidenum">
               <a:rPr b="0" lang="fr-FR" sz="2400" spc="-1" strike="noStrike">
                 <a:solidFill>
                   <a:srgbClr val="000000"/>
@@ -16722,7 +16806,7 @@
         <p:txBody>
           <a:bodyPr/>
           <a:p>
-            <a:fld id="{43FFAECC-8DB4-417C-B63C-1AD1E6D72C3D}" type="slidenum">
+            <a:fld id="{BE405858-0392-4F0F-913C-BDF917EB07EE}" type="slidenum">
               <a:t>5</a:t>
             </a:fld>
           </a:p>
@@ -16771,7 +16855,7 @@
         <p:spPr>
           <a:xfrm>
             <a:off x="1008000" y="260280"/>
-            <a:ext cx="7845480" cy="357120"/>
+            <a:ext cx="7845120" cy="356760"/>
           </a:xfrm>
           <a:prstGeom prst="rect">
             <a:avLst/>
@@ -16823,7 +16907,7 @@
         <p:spPr>
           <a:xfrm>
             <a:off x="360000" y="1080000"/>
-            <a:ext cx="3597120" cy="537120"/>
+            <a:ext cx="3596760" cy="536760"/>
           </a:xfrm>
           <a:prstGeom prst="rect">
             <a:avLst/>
@@ -16876,7 +16960,7 @@
         <p:spPr>
           <a:xfrm>
             <a:off x="4680000" y="1080000"/>
-            <a:ext cx="3597120" cy="717120"/>
+            <a:ext cx="3596760" cy="716760"/>
           </a:xfrm>
           <a:prstGeom prst="rect">
             <a:avLst/>
@@ -16929,7 +17013,7 @@
         <p:spPr>
           <a:xfrm>
             <a:off x="380880" y="2257920"/>
-            <a:ext cx="8436240" cy="1879200"/>
+            <a:ext cx="8435880" cy="1878840"/>
           </a:xfrm>
           <a:prstGeom prst="rect">
             <a:avLst/>
@@ -17074,7 +17158,7 @@
         <p:spPr>
           <a:xfrm>
             <a:off x="360000" y="4500000"/>
-            <a:ext cx="7917120" cy="1077120"/>
+            <a:ext cx="7916760" cy="1076760"/>
           </a:xfrm>
           <a:prstGeom prst="rect">
             <a:avLst/>
@@ -17152,7 +17236,7 @@
         <p:spPr>
           <a:xfrm>
             <a:off x="8820360" y="6431040"/>
-            <a:ext cx="378360" cy="426600"/>
+            <a:ext cx="378000" cy="426240"/>
           </a:xfrm>
           <a:prstGeom prst="rect">
             <a:avLst/>
@@ -17178,7 +17262,7 @@
                 <a:spcPct val="100000"/>
               </a:lnSpc>
             </a:pPr>
-            <a:fld id="{45936EE5-1386-4B4E-88E9-F2A5B67962B7}" type="slidenum">
+            <a:fld id="{F45D6558-0654-4EB2-B994-8ABEE3D0CC77}" type="slidenum">
               <a:rPr b="0" lang="fr-FR" sz="2400" spc="-1" strike="noStrike">
                 <a:solidFill>
                   <a:srgbClr val="000000"/>
@@ -17210,7 +17294,7 @@
         <p:txBody>
           <a:bodyPr/>
           <a:p>
-            <a:fld id="{ED0E2740-FC59-45D2-BB21-06F36008C860}" type="slidenum">
+            <a:fld id="{5EEA18E8-BCE8-45F9-B38C-DFCD576A701A}" type="slidenum">
               <a:t>6</a:t>
             </a:fld>
           </a:p>
@@ -17259,7 +17343,7 @@
         <p:spPr>
           <a:xfrm>
             <a:off x="1008000" y="260280"/>
-            <a:ext cx="7845480" cy="357120"/>
+            <a:ext cx="7845120" cy="356760"/>
           </a:xfrm>
           <a:prstGeom prst="rect">
             <a:avLst/>
@@ -17311,7 +17395,7 @@
         <p:spPr>
           <a:xfrm>
             <a:off x="611640" y="1412640"/>
-            <a:ext cx="7845480" cy="4317120"/>
+            <a:ext cx="7845120" cy="4316760"/>
           </a:xfrm>
           <a:prstGeom prst="rect">
             <a:avLst/>
@@ -17438,7 +17522,7 @@
         <p:spPr>
           <a:xfrm>
             <a:off x="0" y="1412640"/>
-            <a:ext cx="4889520" cy="3804480"/>
+            <a:ext cx="4889160" cy="3804120"/>
           </a:xfrm>
           <a:prstGeom prst="rect">
             <a:avLst/>
@@ -17461,7 +17545,7 @@
         <p:spPr>
           <a:xfrm>
             <a:off x="4839480" y="1260000"/>
-            <a:ext cx="4157640" cy="4109760"/>
+            <a:ext cx="4157280" cy="4109400"/>
           </a:xfrm>
           <a:prstGeom prst="rect">
             <a:avLst/>
@@ -17480,7 +17564,7 @@
         <p:spPr>
           <a:xfrm>
             <a:off x="8820360" y="6431040"/>
-            <a:ext cx="378360" cy="426600"/>
+            <a:ext cx="378000" cy="426240"/>
           </a:xfrm>
           <a:prstGeom prst="rect">
             <a:avLst/>
@@ -17506,7 +17590,7 @@
                 <a:spcPct val="100000"/>
               </a:lnSpc>
             </a:pPr>
-            <a:fld id="{980B5E35-F1F7-4984-9FC2-D953604DA187}" type="slidenum">
+            <a:fld id="{EF4DC943-FA7E-4511-A2E9-112AB0B38C1D}" type="slidenum">
               <a:rPr b="0" lang="fr-FR" sz="2400" spc="-1" strike="noStrike">
                 <a:solidFill>
                   <a:srgbClr val="000000"/>
@@ -17567,7 +17651,7 @@
         <p:spPr>
           <a:xfrm>
             <a:off x="1008000" y="260280"/>
-            <a:ext cx="7845480" cy="357120"/>
+            <a:ext cx="7845120" cy="356760"/>
           </a:xfrm>
           <a:prstGeom prst="rect">
             <a:avLst/>
@@ -17619,7 +17703,7 @@
         <p:spPr>
           <a:xfrm>
             <a:off x="648000" y="836640"/>
-            <a:ext cx="8169120" cy="5280480"/>
+            <a:ext cx="8168760" cy="5280120"/>
           </a:xfrm>
           <a:prstGeom prst="rect">
             <a:avLst/>
@@ -17940,7 +18024,7 @@
         <p:spPr>
           <a:xfrm>
             <a:off x="3960000" y="1800000"/>
-            <a:ext cx="4615920" cy="3049200"/>
+            <a:ext cx="4615560" cy="3048840"/>
           </a:xfrm>
           <a:prstGeom prst="rect">
             <a:avLst/>
@@ -17959,7 +18043,7 @@
         <p:spPr>
           <a:xfrm>
             <a:off x="8820360" y="6431040"/>
-            <a:ext cx="378360" cy="426600"/>
+            <a:ext cx="378000" cy="426240"/>
           </a:xfrm>
           <a:prstGeom prst="rect">
             <a:avLst/>
@@ -17985,7 +18069,7 @@
                 <a:spcPct val="100000"/>
               </a:lnSpc>
             </a:pPr>
-            <a:fld id="{C3A2B263-1FDF-4A0E-90A2-00337962F85F}" type="slidenum">
+            <a:fld id="{4F23CBA3-DE57-4B42-9059-79163563E92A}" type="slidenum">
               <a:rPr b="0" lang="fr-FR" sz="2400" spc="-1" strike="noStrike">
                 <a:solidFill>
                   <a:srgbClr val="000000"/>
@@ -18017,7 +18101,7 @@
         <p:txBody>
           <a:bodyPr/>
           <a:p>
-            <a:fld id="{F4A13D00-F4BB-4F8C-AAC9-71D4B897FAA0}" type="slidenum">
+            <a:fld id="{04FBA7AD-018A-46FE-981A-DB2D6D4732BD}" type="slidenum">
               <a:t>8</a:t>
             </a:fld>
           </a:p>
@@ -18062,7 +18146,7 @@
         <p:spPr>
           <a:xfrm>
             <a:off x="1260000" y="1980000"/>
-            <a:ext cx="6477480" cy="3494160"/>
+            <a:ext cx="6477120" cy="3493800"/>
           </a:xfrm>
           <a:prstGeom prst="rect">
             <a:avLst/>
@@ -18127,7 +18211,7 @@
         <p:spPr>
           <a:xfrm>
             <a:off x="8820360" y="6431040"/>
-            <a:ext cx="378360" cy="426600"/>
+            <a:ext cx="378000" cy="426240"/>
           </a:xfrm>
           <a:prstGeom prst="rect">
             <a:avLst/>
@@ -18153,7 +18237,7 @@
                 <a:spcPct val="100000"/>
               </a:lnSpc>
             </a:pPr>
-            <a:fld id="{3C59E27C-EF30-45D7-9E1E-714E40EA9E07}" type="slidenum">
+            <a:fld id="{F0BFBDD9-2218-42CB-99EC-2ACD479E4CBB}" type="slidenum">
               <a:rPr b="0" lang="fr-FR" sz="2400" spc="-1" strike="noStrike">
                 <a:solidFill>
                   <a:srgbClr val="000000"/>
@@ -18185,7 +18269,7 @@
         <p:txBody>
           <a:bodyPr/>
           <a:p>
-            <a:fld id="{5EE8A8EE-B692-4968-BC31-86F98E3B3454}" type="slidenum">
+            <a:fld id="{7FC25470-5077-4D4A-A386-EBBA14FD44D4}" type="slidenum">
               <a:t>9</a:t>
             </a:fld>
           </a:p>
@@ -18379,7 +18463,7 @@
 </a:theme>
 </file>
 
-<file path=ppt/theme/theme25.xml><?xml version="1.0" encoding="utf-8"?>
+<file path=ppt/theme/theme13.xml><?xml version="1.0" encoding="utf-8"?>
 <a:theme xmlns:a="http://schemas.openxmlformats.org/drawingml/2006/main" xmlns:r="http://schemas.openxmlformats.org/officeDocument/2006/relationships" name="Office Theme">
   <a:themeElements>
     <a:clrScheme name="LibreOffice">

</xml_diff>